<commit_message>
modify docs/Intro to Digital Twin Unity - connecting with webapi.pptx
</commit_message>
<xml_diff>
--- a/docs/Intro to Digital Twin Unity - connecting with webapi.pptx
+++ b/docs/Intro to Digital Twin Unity - connecting with webapi.pptx
@@ -5,7 +5,7 @@
     <p:sldMasterId id="2147483744" r:id="rId1"/>
   </p:sldMasterIdLst>
   <p:notesMasterIdLst>
-    <p:notesMasterId r:id="rId25"/>
+    <p:notesMasterId r:id="rId26"/>
   </p:notesMasterIdLst>
   <p:sldIdLst>
     <p:sldId id="319" r:id="rId2"/>
@@ -30,7 +30,8 @@
     <p:sldId id="453" r:id="rId21"/>
     <p:sldId id="459" r:id="rId22"/>
     <p:sldId id="460" r:id="rId23"/>
-    <p:sldId id="441" r:id="rId24"/>
+    <p:sldId id="461" r:id="rId24"/>
+    <p:sldId id="441" r:id="rId25"/>
   </p:sldIdLst>
   <p:sldSz cx="13433425" cy="7556500"/>
   <p:notesSz cx="10693400" cy="7556500"/>
@@ -230,7 +231,7 @@
           <a:p>
             <a:fld id="{A243A906-1D69-43FB-82F7-B1CFC901B944}" type="datetimeFigureOut">
               <a:rPr lang="en-ID" smtClean="0"/>
-              <a:t>21/10/2024</a:t>
+              <a:t>23/10/2024</a:t>
             </a:fld>
             <a:endParaRPr lang="en-ID"/>
           </a:p>
@@ -1880,6 +1881,93 @@
 </p:notes>
 </file>
 
+<file path=ppt/notesSlides/notesSlide22.xml><?xml version="1.0" encoding="utf-8"?>
+<p:notes xmlns:a="http://schemas.openxmlformats.org/drawingml/2006/main" xmlns:r="http://schemas.openxmlformats.org/officeDocument/2006/relationships" xmlns:p="http://schemas.openxmlformats.org/presentationml/2006/main">
+  <p:cSld>
+    <p:spTree>
+      <p:nvGrpSpPr>
+        <p:cNvPr id="1" name=""/>
+        <p:cNvGrpSpPr/>
+        <p:nvPr/>
+      </p:nvGrpSpPr>
+      <p:grpSpPr>
+        <a:xfrm>
+          <a:off x="0" y="0"/>
+          <a:ext cx="0" cy="0"/>
+          <a:chOff x="0" y="0"/>
+          <a:chExt cx="0" cy="0"/>
+        </a:xfrm>
+      </p:grpSpPr>
+      <p:sp>
+        <p:nvSpPr>
+          <p:cNvPr id="2" name="Slide Image Placeholder 1"/>
+          <p:cNvSpPr>
+            <a:spLocks noGrp="1" noRot="1" noChangeAspect="1"/>
+          </p:cNvSpPr>
+          <p:nvPr>
+            <p:ph type="sldImg"/>
+          </p:nvPr>
+        </p:nvSpPr>
+        <p:spPr/>
+      </p:sp>
+      <p:sp>
+        <p:nvSpPr>
+          <p:cNvPr id="3" name="Notes Placeholder 2"/>
+          <p:cNvSpPr>
+            <a:spLocks noGrp="1"/>
+          </p:cNvSpPr>
+          <p:nvPr>
+            <p:ph type="body" idx="1"/>
+          </p:nvPr>
+        </p:nvSpPr>
+        <p:spPr/>
+        <p:txBody>
+          <a:bodyPr/>
+          <a:lstStyle/>
+          <a:p>
+            <a:r>
+              <a:rPr lang="en-ID" dirty="0"/>
+              <a:t>https://medium.com/@sonusprocks/unity-webrequest-made-simple-92d967a1b86c</a:t>
+            </a:r>
+          </a:p>
+        </p:txBody>
+      </p:sp>
+      <p:sp>
+        <p:nvSpPr>
+          <p:cNvPr id="4" name="Slide Number Placeholder 3"/>
+          <p:cNvSpPr>
+            <a:spLocks noGrp="1"/>
+          </p:cNvSpPr>
+          <p:nvPr>
+            <p:ph type="sldNum" sz="quarter" idx="5"/>
+          </p:nvPr>
+        </p:nvSpPr>
+        <p:spPr/>
+        <p:txBody>
+          <a:bodyPr/>
+          <a:lstStyle/>
+          <a:p>
+            <a:fld id="{415248A3-07BB-46ED-9FB8-A25D03CBF3B4}" type="slidenum">
+              <a:rPr lang="en-ID" smtClean="0"/>
+              <a:t>23</a:t>
+            </a:fld>
+            <a:endParaRPr lang="en-ID"/>
+          </a:p>
+        </p:txBody>
+      </p:sp>
+    </p:spTree>
+    <p:extLst>
+      <p:ext uri="{BB962C8B-B14F-4D97-AF65-F5344CB8AC3E}">
+        <p14:creationId xmlns:p14="http://schemas.microsoft.com/office/powerpoint/2010/main" val="1012291155"/>
+      </p:ext>
+    </p:extLst>
+  </p:cSld>
+  <p:clrMapOvr>
+    <a:masterClrMapping/>
+  </p:clrMapOvr>
+</p:notes>
+</file>
+
 <file path=ppt/notesSlides/notesSlide3.xml><?xml version="1.0" encoding="utf-8"?>
 <p:notes xmlns:a="http://schemas.openxmlformats.org/drawingml/2006/main" xmlns:r="http://schemas.openxmlformats.org/officeDocument/2006/relationships" xmlns:p="http://schemas.openxmlformats.org/presentationml/2006/main">
   <p:cSld>
@@ -2743,7 +2831,7 @@
           <a:p>
             <a:fld id="{1D8BD707-D9CF-40AE-B4C6-C98DA3205C09}" type="datetimeFigureOut">
               <a:rPr lang="en-US" smtClean="0"/>
-              <a:t>10/21/2024</a:t>
+              <a:t>10/23/2024</a:t>
             </a:fld>
             <a:endParaRPr lang="en-US"/>
           </a:p>
@@ -2951,7 +3039,7 @@
           <a:p>
             <a:fld id="{1D8BD707-D9CF-40AE-B4C6-C98DA3205C09}" type="datetimeFigureOut">
               <a:rPr lang="en-US" smtClean="0"/>
-              <a:t>10/21/2024</a:t>
+              <a:t>10/23/2024</a:t>
             </a:fld>
             <a:endParaRPr lang="en-US"/>
           </a:p>
@@ -3207,7 +3295,7 @@
           <a:p>
             <a:fld id="{1D8BD707-D9CF-40AE-B4C6-C98DA3205C09}" type="datetimeFigureOut">
               <a:rPr lang="en-US" smtClean="0"/>
-              <a:t>10/21/2024</a:t>
+              <a:t>10/23/2024</a:t>
             </a:fld>
             <a:endParaRPr lang="en-US"/>
           </a:p>
@@ -3381,7 +3469,7 @@
           <a:p>
             <a:fld id="{1D8BD707-D9CF-40AE-B4C6-C98DA3205C09}" type="datetimeFigureOut">
               <a:rPr lang="en-US" smtClean="0"/>
-              <a:t>10/21/2024</a:t>
+              <a:t>10/23/2024</a:t>
             </a:fld>
             <a:endParaRPr lang="en-US"/>
           </a:p>
@@ -3724,7 +3812,7 @@
           <a:p>
             <a:fld id="{1D8BD707-D9CF-40AE-B4C6-C98DA3205C09}" type="datetimeFigureOut">
               <a:rPr lang="en-US" smtClean="0"/>
-              <a:t>10/21/2024</a:t>
+              <a:t>10/23/2024</a:t>
             </a:fld>
             <a:endParaRPr lang="en-US"/>
           </a:p>
@@ -3999,7 +4087,7 @@
           <a:p>
             <a:fld id="{1D8BD707-D9CF-40AE-B4C6-C98DA3205C09}" type="datetimeFigureOut">
               <a:rPr lang="en-US" smtClean="0"/>
-              <a:t>10/21/2024</a:t>
+              <a:t>10/23/2024</a:t>
             </a:fld>
             <a:endParaRPr lang="en-US"/>
           </a:p>
@@ -4378,7 +4466,7 @@
           <a:p>
             <a:fld id="{1D8BD707-D9CF-40AE-B4C6-C98DA3205C09}" type="datetimeFigureOut">
               <a:rPr lang="en-US" smtClean="0"/>
-              <a:t>10/21/2024</a:t>
+              <a:t>10/23/2024</a:t>
             </a:fld>
             <a:endParaRPr lang="en-US"/>
           </a:p>
@@ -4496,7 +4584,7 @@
           <a:p>
             <a:fld id="{1D8BD707-D9CF-40AE-B4C6-C98DA3205C09}" type="datetimeFigureOut">
               <a:rPr lang="en-US" smtClean="0"/>
-              <a:t>10/21/2024</a:t>
+              <a:t>10/23/2024</a:t>
             </a:fld>
             <a:endParaRPr lang="en-US"/>
           </a:p>
@@ -4667,7 +4755,7 @@
           <a:p>
             <a:fld id="{1D8BD707-D9CF-40AE-B4C6-C98DA3205C09}" type="datetimeFigureOut">
               <a:rPr lang="en-US" smtClean="0"/>
-              <a:t>10/21/2024</a:t>
+              <a:t>10/23/2024</a:t>
             </a:fld>
             <a:endParaRPr lang="en-US"/>
           </a:p>
@@ -5021,7 +5109,7 @@
           <a:p>
             <a:fld id="{1D8BD707-D9CF-40AE-B4C6-C98DA3205C09}" type="datetimeFigureOut">
               <a:rPr lang="en-US" smtClean="0"/>
-              <a:t>10/21/2024</a:t>
+              <a:t>10/23/2024</a:t>
             </a:fld>
             <a:endParaRPr lang="en-US"/>
           </a:p>
@@ -5403,7 +5491,7 @@
           <a:p>
             <a:fld id="{1D8BD707-D9CF-40AE-B4C6-C98DA3205C09}" type="datetimeFigureOut">
               <a:rPr lang="en-US" smtClean="0"/>
-              <a:t>10/21/2024</a:t>
+              <a:t>10/23/2024</a:t>
             </a:fld>
             <a:endParaRPr lang="en-US"/>
           </a:p>
@@ -5690,7 +5778,7 @@
           <a:p>
             <a:fld id="{1D8BD707-D9CF-40AE-B4C6-C98DA3205C09}" type="datetimeFigureOut">
               <a:rPr lang="en-US" smtClean="0"/>
-              <a:t>10/21/2024</a:t>
+              <a:t>10/23/2024</a:t>
             </a:fld>
             <a:endParaRPr lang="en-US"/>
           </a:p>
@@ -6375,7 +6463,7 @@
         <p:spPr>
           <a:xfrm>
             <a:off x="1306512" y="1949450"/>
-            <a:ext cx="11785537" cy="3924664"/>
+            <a:ext cx="11785537" cy="3424527"/>
           </a:xfrm>
           <a:prstGeom prst="rect">
             <a:avLst/>
@@ -6570,24 +6658,6 @@
               <a:t>: to manage the state of application environment based on the weather. (using weather code.)</a:t>
             </a:r>
           </a:p>
-          <a:p>
-            <a:pPr marL="469900" marR="5080" indent="-457200">
-              <a:lnSpc>
-                <a:spcPts val="3350"/>
-              </a:lnSpc>
-              <a:spcBef>
-                <a:spcPts val="515"/>
-              </a:spcBef>
-              <a:buFont typeface="Arial" panose="020B0604020202020204" pitchFamily="34" charset="0"/>
-              <a:buChar char="•"/>
-              <a:tabLst>
-                <a:tab pos="241300" algn="l"/>
-              </a:tabLst>
-            </a:pPr>
-            <a:endParaRPr lang="en-US" sz="2800" dirty="0">
-              <a:cs typeface="Consolas"/>
-            </a:endParaRPr>
-          </a:p>
         </p:txBody>
       </p:sp>
     </p:spTree>
@@ -6600,6 +6670,402 @@
   <p:clrMapOvr>
     <a:masterClrMapping/>
   </p:clrMapOvr>
+  <p:timing>
+    <p:tnLst>
+      <p:par>
+        <p:cTn id="1" dur="indefinite" restart="never" nodeType="tmRoot">
+          <p:childTnLst>
+            <p:seq concurrent="1" nextAc="seek">
+              <p:cTn id="2" dur="indefinite" nodeType="mainSeq">
+                <p:childTnLst>
+                  <p:par>
+                    <p:cTn id="3" fill="hold">
+                      <p:stCondLst>
+                        <p:cond delay="indefinite"/>
+                      </p:stCondLst>
+                      <p:childTnLst>
+                        <p:par>
+                          <p:cTn id="4" fill="hold">
+                            <p:stCondLst>
+                              <p:cond delay="0"/>
+                            </p:stCondLst>
+                            <p:childTnLst>
+                              <p:par>
+                                <p:cTn id="5" presetID="10" presetClass="entr" presetSubtype="0" fill="hold" nodeType="clickEffect">
+                                  <p:stCondLst>
+                                    <p:cond delay="0"/>
+                                  </p:stCondLst>
+                                  <p:childTnLst>
+                                    <p:set>
+                                      <p:cBhvr>
+                                        <p:cTn id="6" dur="1" fill="hold">
+                                          <p:stCondLst>
+                                            <p:cond delay="0"/>
+                                          </p:stCondLst>
+                                        </p:cTn>
+                                        <p:tgtEl>
+                                          <p:spTgt spid="4">
+                                            <p:txEl>
+                                              <p:pRg st="0" end="0"/>
+                                            </p:txEl>
+                                          </p:spTgt>
+                                        </p:tgtEl>
+                                        <p:attrNameLst>
+                                          <p:attrName>style.visibility</p:attrName>
+                                        </p:attrNameLst>
+                                      </p:cBhvr>
+                                      <p:to>
+                                        <p:strVal val="visible"/>
+                                      </p:to>
+                                    </p:set>
+                                    <p:animEffect transition="in" filter="fade">
+                                      <p:cBhvr>
+                                        <p:cTn id="7" dur="500"/>
+                                        <p:tgtEl>
+                                          <p:spTgt spid="4">
+                                            <p:txEl>
+                                              <p:pRg st="0" end="0"/>
+                                            </p:txEl>
+                                          </p:spTgt>
+                                        </p:tgtEl>
+                                      </p:cBhvr>
+                                    </p:animEffect>
+                                  </p:childTnLst>
+                                </p:cTn>
+                              </p:par>
+                            </p:childTnLst>
+                          </p:cTn>
+                        </p:par>
+                      </p:childTnLst>
+                    </p:cTn>
+                  </p:par>
+                  <p:par>
+                    <p:cTn id="8" fill="hold">
+                      <p:stCondLst>
+                        <p:cond delay="indefinite"/>
+                      </p:stCondLst>
+                      <p:childTnLst>
+                        <p:par>
+                          <p:cTn id="9" fill="hold">
+                            <p:stCondLst>
+                              <p:cond delay="0"/>
+                            </p:stCondLst>
+                            <p:childTnLst>
+                              <p:par>
+                                <p:cTn id="10" presetID="10" presetClass="entr" presetSubtype="0" fill="hold" nodeType="clickEffect">
+                                  <p:stCondLst>
+                                    <p:cond delay="0"/>
+                                  </p:stCondLst>
+                                  <p:childTnLst>
+                                    <p:set>
+                                      <p:cBhvr>
+                                        <p:cTn id="11" dur="1" fill="hold">
+                                          <p:stCondLst>
+                                            <p:cond delay="0"/>
+                                          </p:stCondLst>
+                                        </p:cTn>
+                                        <p:tgtEl>
+                                          <p:spTgt spid="4">
+                                            <p:txEl>
+                                              <p:pRg st="1" end="1"/>
+                                            </p:txEl>
+                                          </p:spTgt>
+                                        </p:tgtEl>
+                                        <p:attrNameLst>
+                                          <p:attrName>style.visibility</p:attrName>
+                                        </p:attrNameLst>
+                                      </p:cBhvr>
+                                      <p:to>
+                                        <p:strVal val="visible"/>
+                                      </p:to>
+                                    </p:set>
+                                    <p:animEffect transition="in" filter="fade">
+                                      <p:cBhvr>
+                                        <p:cTn id="12" dur="500"/>
+                                        <p:tgtEl>
+                                          <p:spTgt spid="4">
+                                            <p:txEl>
+                                              <p:pRg st="1" end="1"/>
+                                            </p:txEl>
+                                          </p:spTgt>
+                                        </p:tgtEl>
+                                      </p:cBhvr>
+                                    </p:animEffect>
+                                  </p:childTnLst>
+                                </p:cTn>
+                              </p:par>
+                            </p:childTnLst>
+                          </p:cTn>
+                        </p:par>
+                      </p:childTnLst>
+                    </p:cTn>
+                  </p:par>
+                  <p:par>
+                    <p:cTn id="13" fill="hold">
+                      <p:stCondLst>
+                        <p:cond delay="indefinite"/>
+                      </p:stCondLst>
+                      <p:childTnLst>
+                        <p:par>
+                          <p:cTn id="14" fill="hold">
+                            <p:stCondLst>
+                              <p:cond delay="0"/>
+                            </p:stCondLst>
+                            <p:childTnLst>
+                              <p:par>
+                                <p:cTn id="15" presetID="10" presetClass="entr" presetSubtype="0" fill="hold" nodeType="clickEffect">
+                                  <p:stCondLst>
+                                    <p:cond delay="0"/>
+                                  </p:stCondLst>
+                                  <p:childTnLst>
+                                    <p:set>
+                                      <p:cBhvr>
+                                        <p:cTn id="16" dur="1" fill="hold">
+                                          <p:stCondLst>
+                                            <p:cond delay="0"/>
+                                          </p:stCondLst>
+                                        </p:cTn>
+                                        <p:tgtEl>
+                                          <p:spTgt spid="4">
+                                            <p:txEl>
+                                              <p:pRg st="2" end="2"/>
+                                            </p:txEl>
+                                          </p:spTgt>
+                                        </p:tgtEl>
+                                        <p:attrNameLst>
+                                          <p:attrName>style.visibility</p:attrName>
+                                        </p:attrNameLst>
+                                      </p:cBhvr>
+                                      <p:to>
+                                        <p:strVal val="visible"/>
+                                      </p:to>
+                                    </p:set>
+                                    <p:animEffect transition="in" filter="fade">
+                                      <p:cBhvr>
+                                        <p:cTn id="17" dur="500"/>
+                                        <p:tgtEl>
+                                          <p:spTgt spid="4">
+                                            <p:txEl>
+                                              <p:pRg st="2" end="2"/>
+                                            </p:txEl>
+                                          </p:spTgt>
+                                        </p:tgtEl>
+                                      </p:cBhvr>
+                                    </p:animEffect>
+                                  </p:childTnLst>
+                                </p:cTn>
+                              </p:par>
+                            </p:childTnLst>
+                          </p:cTn>
+                        </p:par>
+                      </p:childTnLst>
+                    </p:cTn>
+                  </p:par>
+                  <p:par>
+                    <p:cTn id="18" fill="hold">
+                      <p:stCondLst>
+                        <p:cond delay="indefinite"/>
+                      </p:stCondLst>
+                      <p:childTnLst>
+                        <p:par>
+                          <p:cTn id="19" fill="hold">
+                            <p:stCondLst>
+                              <p:cond delay="0"/>
+                            </p:stCondLst>
+                            <p:childTnLst>
+                              <p:par>
+                                <p:cTn id="20" presetID="10" presetClass="entr" presetSubtype="0" fill="hold" nodeType="clickEffect">
+                                  <p:stCondLst>
+                                    <p:cond delay="0"/>
+                                  </p:stCondLst>
+                                  <p:childTnLst>
+                                    <p:set>
+                                      <p:cBhvr>
+                                        <p:cTn id="21" dur="1" fill="hold">
+                                          <p:stCondLst>
+                                            <p:cond delay="0"/>
+                                          </p:stCondLst>
+                                        </p:cTn>
+                                        <p:tgtEl>
+                                          <p:spTgt spid="4">
+                                            <p:txEl>
+                                              <p:pRg st="3" end="3"/>
+                                            </p:txEl>
+                                          </p:spTgt>
+                                        </p:tgtEl>
+                                        <p:attrNameLst>
+                                          <p:attrName>style.visibility</p:attrName>
+                                        </p:attrNameLst>
+                                      </p:cBhvr>
+                                      <p:to>
+                                        <p:strVal val="visible"/>
+                                      </p:to>
+                                    </p:set>
+                                    <p:animEffect transition="in" filter="fade">
+                                      <p:cBhvr>
+                                        <p:cTn id="22" dur="500"/>
+                                        <p:tgtEl>
+                                          <p:spTgt spid="4">
+                                            <p:txEl>
+                                              <p:pRg st="3" end="3"/>
+                                            </p:txEl>
+                                          </p:spTgt>
+                                        </p:tgtEl>
+                                      </p:cBhvr>
+                                    </p:animEffect>
+                                  </p:childTnLst>
+                                </p:cTn>
+                              </p:par>
+                            </p:childTnLst>
+                          </p:cTn>
+                        </p:par>
+                      </p:childTnLst>
+                    </p:cTn>
+                  </p:par>
+                  <p:par>
+                    <p:cTn id="23" fill="hold">
+                      <p:stCondLst>
+                        <p:cond delay="indefinite"/>
+                      </p:stCondLst>
+                      <p:childTnLst>
+                        <p:par>
+                          <p:cTn id="24" fill="hold">
+                            <p:stCondLst>
+                              <p:cond delay="0"/>
+                            </p:stCondLst>
+                            <p:childTnLst>
+                              <p:par>
+                                <p:cTn id="25" presetID="10" presetClass="entr" presetSubtype="0" fill="hold" nodeType="clickEffect">
+                                  <p:stCondLst>
+                                    <p:cond delay="0"/>
+                                  </p:stCondLst>
+                                  <p:childTnLst>
+                                    <p:set>
+                                      <p:cBhvr>
+                                        <p:cTn id="26" dur="1" fill="hold">
+                                          <p:stCondLst>
+                                            <p:cond delay="0"/>
+                                          </p:stCondLst>
+                                        </p:cTn>
+                                        <p:tgtEl>
+                                          <p:spTgt spid="4">
+                                            <p:txEl>
+                                              <p:pRg st="4" end="4"/>
+                                            </p:txEl>
+                                          </p:spTgt>
+                                        </p:tgtEl>
+                                        <p:attrNameLst>
+                                          <p:attrName>style.visibility</p:attrName>
+                                        </p:attrNameLst>
+                                      </p:cBhvr>
+                                      <p:to>
+                                        <p:strVal val="visible"/>
+                                      </p:to>
+                                    </p:set>
+                                    <p:animEffect transition="in" filter="fade">
+                                      <p:cBhvr>
+                                        <p:cTn id="27" dur="500"/>
+                                        <p:tgtEl>
+                                          <p:spTgt spid="4">
+                                            <p:txEl>
+                                              <p:pRg st="4" end="4"/>
+                                            </p:txEl>
+                                          </p:spTgt>
+                                        </p:tgtEl>
+                                      </p:cBhvr>
+                                    </p:animEffect>
+                                  </p:childTnLst>
+                                </p:cTn>
+                              </p:par>
+                            </p:childTnLst>
+                          </p:cTn>
+                        </p:par>
+                      </p:childTnLst>
+                    </p:cTn>
+                  </p:par>
+                  <p:par>
+                    <p:cTn id="28" fill="hold">
+                      <p:stCondLst>
+                        <p:cond delay="indefinite"/>
+                      </p:stCondLst>
+                      <p:childTnLst>
+                        <p:par>
+                          <p:cTn id="29" fill="hold">
+                            <p:stCondLst>
+                              <p:cond delay="0"/>
+                            </p:stCondLst>
+                            <p:childTnLst>
+                              <p:par>
+                                <p:cTn id="30" presetID="10" presetClass="entr" presetSubtype="0" fill="hold" nodeType="clickEffect">
+                                  <p:stCondLst>
+                                    <p:cond delay="0"/>
+                                  </p:stCondLst>
+                                  <p:childTnLst>
+                                    <p:set>
+                                      <p:cBhvr>
+                                        <p:cTn id="31" dur="1" fill="hold">
+                                          <p:stCondLst>
+                                            <p:cond delay="0"/>
+                                          </p:stCondLst>
+                                        </p:cTn>
+                                        <p:tgtEl>
+                                          <p:spTgt spid="4">
+                                            <p:txEl>
+                                              <p:pRg st="5" end="5"/>
+                                            </p:txEl>
+                                          </p:spTgt>
+                                        </p:tgtEl>
+                                        <p:attrNameLst>
+                                          <p:attrName>style.visibility</p:attrName>
+                                        </p:attrNameLst>
+                                      </p:cBhvr>
+                                      <p:to>
+                                        <p:strVal val="visible"/>
+                                      </p:to>
+                                    </p:set>
+                                    <p:animEffect transition="in" filter="fade">
+                                      <p:cBhvr>
+                                        <p:cTn id="32" dur="500"/>
+                                        <p:tgtEl>
+                                          <p:spTgt spid="4">
+                                            <p:txEl>
+                                              <p:pRg st="5" end="5"/>
+                                            </p:txEl>
+                                          </p:spTgt>
+                                        </p:tgtEl>
+                                      </p:cBhvr>
+                                    </p:animEffect>
+                                  </p:childTnLst>
+                                </p:cTn>
+                              </p:par>
+                            </p:childTnLst>
+                          </p:cTn>
+                        </p:par>
+                      </p:childTnLst>
+                    </p:cTn>
+                  </p:par>
+                </p:childTnLst>
+              </p:cTn>
+              <p:prevCondLst>
+                <p:cond evt="onPrev" delay="0">
+                  <p:tgtEl>
+                    <p:sldTgt/>
+                  </p:tgtEl>
+                </p:cond>
+              </p:prevCondLst>
+              <p:nextCondLst>
+                <p:cond evt="onNext" delay="0">
+                  <p:tgtEl>
+                    <p:sldTgt/>
+                  </p:tgtEl>
+                </p:cond>
+              </p:nextCondLst>
+            </p:seq>
+          </p:childTnLst>
+        </p:cTn>
+      </p:par>
+    </p:tnLst>
+  </p:timing>
 </p:sld>
 </file>
 
@@ -6768,6 +7234,89 @@
   <p:clrMapOvr>
     <a:masterClrMapping/>
   </p:clrMapOvr>
+  <p:timing>
+    <p:tnLst>
+      <p:par>
+        <p:cTn id="1" dur="indefinite" restart="never" nodeType="tmRoot">
+          <p:childTnLst>
+            <p:seq concurrent="1" nextAc="seek">
+              <p:cTn id="2" dur="indefinite" nodeType="mainSeq">
+                <p:childTnLst>
+                  <p:par>
+                    <p:cTn id="3" fill="hold">
+                      <p:stCondLst>
+                        <p:cond delay="indefinite"/>
+                      </p:stCondLst>
+                      <p:childTnLst>
+                        <p:par>
+                          <p:cTn id="4" fill="hold">
+                            <p:stCondLst>
+                              <p:cond delay="0"/>
+                            </p:stCondLst>
+                            <p:childTnLst>
+                              <p:par>
+                                <p:cTn id="5" presetID="10" presetClass="entr" presetSubtype="0" fill="hold" nodeType="clickEffect">
+                                  <p:stCondLst>
+                                    <p:cond delay="0"/>
+                                  </p:stCondLst>
+                                  <p:childTnLst>
+                                    <p:set>
+                                      <p:cBhvr>
+                                        <p:cTn id="6" dur="1" fill="hold">
+                                          <p:stCondLst>
+                                            <p:cond delay="0"/>
+                                          </p:stCondLst>
+                                        </p:cTn>
+                                        <p:tgtEl>
+                                          <p:spTgt spid="5"/>
+                                        </p:tgtEl>
+                                        <p:attrNameLst>
+                                          <p:attrName>style.visibility</p:attrName>
+                                        </p:attrNameLst>
+                                      </p:cBhvr>
+                                      <p:to>
+                                        <p:strVal val="visible"/>
+                                      </p:to>
+                                    </p:set>
+                                    <p:animEffect transition="in" filter="fade">
+                                      <p:cBhvr>
+                                        <p:cTn id="7" dur="500"/>
+                                        <p:tgtEl>
+                                          <p:spTgt spid="5"/>
+                                        </p:tgtEl>
+                                      </p:cBhvr>
+                                    </p:animEffect>
+                                  </p:childTnLst>
+                                </p:cTn>
+                              </p:par>
+                            </p:childTnLst>
+                          </p:cTn>
+                        </p:par>
+                      </p:childTnLst>
+                    </p:cTn>
+                  </p:par>
+                </p:childTnLst>
+              </p:cTn>
+              <p:prevCondLst>
+                <p:cond evt="onPrev" delay="0">
+                  <p:tgtEl>
+                    <p:sldTgt/>
+                  </p:tgtEl>
+                </p:cond>
+              </p:prevCondLst>
+              <p:nextCondLst>
+                <p:cond evt="onNext" delay="0">
+                  <p:tgtEl>
+                    <p:sldTgt/>
+                  </p:tgtEl>
+                </p:cond>
+              </p:nextCondLst>
+            </p:seq>
+          </p:childTnLst>
+        </p:cTn>
+      </p:par>
+    </p:tnLst>
+  </p:timing>
 </p:sld>
 </file>
 
@@ -8115,7 +8664,7 @@
               <a:rPr lang="en-US" sz="2800" dirty="0">
                 <a:cs typeface="Consolas"/>
               </a:rPr>
-              <a:t>But first, you need to signup and then find your API key under your account, and start using API right away!</a:t>
+              <a:t>Usually, you need to signup and then find your API key under your account and start using API right away!</a:t>
             </a:r>
           </a:p>
           <a:p>
@@ -8235,6 +8784,394 @@
   <p:clrMapOvr>
     <a:masterClrMapping/>
   </p:clrMapOvr>
+  <p:timing>
+    <p:tnLst>
+      <p:par>
+        <p:cTn id="1" dur="indefinite" restart="never" nodeType="tmRoot">
+          <p:childTnLst>
+            <p:seq concurrent="1" nextAc="seek">
+              <p:cTn id="2" dur="indefinite" nodeType="mainSeq">
+                <p:childTnLst>
+                  <p:par>
+                    <p:cTn id="3" fill="hold">
+                      <p:stCondLst>
+                        <p:cond delay="indefinite"/>
+                      </p:stCondLst>
+                      <p:childTnLst>
+                        <p:par>
+                          <p:cTn id="4" fill="hold">
+                            <p:stCondLst>
+                              <p:cond delay="0"/>
+                            </p:stCondLst>
+                            <p:childTnLst>
+                              <p:par>
+                                <p:cTn id="5" presetID="10" presetClass="entr" presetSubtype="0" fill="hold" nodeType="clickEffect">
+                                  <p:stCondLst>
+                                    <p:cond delay="0"/>
+                                  </p:stCondLst>
+                                  <p:childTnLst>
+                                    <p:set>
+                                      <p:cBhvr>
+                                        <p:cTn id="6" dur="1" fill="hold">
+                                          <p:stCondLst>
+                                            <p:cond delay="0"/>
+                                          </p:stCondLst>
+                                        </p:cTn>
+                                        <p:tgtEl>
+                                          <p:spTgt spid="4">
+                                            <p:txEl>
+                                              <p:pRg st="0" end="0"/>
+                                            </p:txEl>
+                                          </p:spTgt>
+                                        </p:tgtEl>
+                                        <p:attrNameLst>
+                                          <p:attrName>style.visibility</p:attrName>
+                                        </p:attrNameLst>
+                                      </p:cBhvr>
+                                      <p:to>
+                                        <p:strVal val="visible"/>
+                                      </p:to>
+                                    </p:set>
+                                    <p:animEffect transition="in" filter="fade">
+                                      <p:cBhvr>
+                                        <p:cTn id="7" dur="500"/>
+                                        <p:tgtEl>
+                                          <p:spTgt spid="4">
+                                            <p:txEl>
+                                              <p:pRg st="0" end="0"/>
+                                            </p:txEl>
+                                          </p:spTgt>
+                                        </p:tgtEl>
+                                      </p:cBhvr>
+                                    </p:animEffect>
+                                  </p:childTnLst>
+                                </p:cTn>
+                              </p:par>
+                            </p:childTnLst>
+                          </p:cTn>
+                        </p:par>
+                      </p:childTnLst>
+                    </p:cTn>
+                  </p:par>
+                  <p:par>
+                    <p:cTn id="8" fill="hold">
+                      <p:stCondLst>
+                        <p:cond delay="indefinite"/>
+                      </p:stCondLst>
+                      <p:childTnLst>
+                        <p:par>
+                          <p:cTn id="9" fill="hold">
+                            <p:stCondLst>
+                              <p:cond delay="0"/>
+                            </p:stCondLst>
+                            <p:childTnLst>
+                              <p:par>
+                                <p:cTn id="10" presetID="10" presetClass="entr" presetSubtype="0" fill="hold" nodeType="clickEffect">
+                                  <p:stCondLst>
+                                    <p:cond delay="0"/>
+                                  </p:stCondLst>
+                                  <p:childTnLst>
+                                    <p:set>
+                                      <p:cBhvr>
+                                        <p:cTn id="11" dur="1" fill="hold">
+                                          <p:stCondLst>
+                                            <p:cond delay="0"/>
+                                          </p:stCondLst>
+                                        </p:cTn>
+                                        <p:tgtEl>
+                                          <p:spTgt spid="4">
+                                            <p:txEl>
+                                              <p:pRg st="1" end="1"/>
+                                            </p:txEl>
+                                          </p:spTgt>
+                                        </p:tgtEl>
+                                        <p:attrNameLst>
+                                          <p:attrName>style.visibility</p:attrName>
+                                        </p:attrNameLst>
+                                      </p:cBhvr>
+                                      <p:to>
+                                        <p:strVal val="visible"/>
+                                      </p:to>
+                                    </p:set>
+                                    <p:animEffect transition="in" filter="fade">
+                                      <p:cBhvr>
+                                        <p:cTn id="12" dur="500"/>
+                                        <p:tgtEl>
+                                          <p:spTgt spid="4">
+                                            <p:txEl>
+                                              <p:pRg st="1" end="1"/>
+                                            </p:txEl>
+                                          </p:spTgt>
+                                        </p:tgtEl>
+                                      </p:cBhvr>
+                                    </p:animEffect>
+                                  </p:childTnLst>
+                                </p:cTn>
+                              </p:par>
+                            </p:childTnLst>
+                          </p:cTn>
+                        </p:par>
+                      </p:childTnLst>
+                    </p:cTn>
+                  </p:par>
+                  <p:par>
+                    <p:cTn id="13" fill="hold">
+                      <p:stCondLst>
+                        <p:cond delay="indefinite"/>
+                      </p:stCondLst>
+                      <p:childTnLst>
+                        <p:par>
+                          <p:cTn id="14" fill="hold">
+                            <p:stCondLst>
+                              <p:cond delay="0"/>
+                            </p:stCondLst>
+                            <p:childTnLst>
+                              <p:par>
+                                <p:cTn id="15" presetID="10" presetClass="entr" presetSubtype="0" fill="hold" nodeType="clickEffect">
+                                  <p:stCondLst>
+                                    <p:cond delay="0"/>
+                                  </p:stCondLst>
+                                  <p:childTnLst>
+                                    <p:set>
+                                      <p:cBhvr>
+                                        <p:cTn id="16" dur="1" fill="hold">
+                                          <p:stCondLst>
+                                            <p:cond delay="0"/>
+                                          </p:stCondLst>
+                                        </p:cTn>
+                                        <p:tgtEl>
+                                          <p:spTgt spid="4">
+                                            <p:txEl>
+                                              <p:pRg st="2" end="2"/>
+                                            </p:txEl>
+                                          </p:spTgt>
+                                        </p:tgtEl>
+                                        <p:attrNameLst>
+                                          <p:attrName>style.visibility</p:attrName>
+                                        </p:attrNameLst>
+                                      </p:cBhvr>
+                                      <p:to>
+                                        <p:strVal val="visible"/>
+                                      </p:to>
+                                    </p:set>
+                                    <p:animEffect transition="in" filter="fade">
+                                      <p:cBhvr>
+                                        <p:cTn id="17" dur="500"/>
+                                        <p:tgtEl>
+                                          <p:spTgt spid="4">
+                                            <p:txEl>
+                                              <p:pRg st="2" end="2"/>
+                                            </p:txEl>
+                                          </p:spTgt>
+                                        </p:tgtEl>
+                                      </p:cBhvr>
+                                    </p:animEffect>
+                                  </p:childTnLst>
+                                </p:cTn>
+                              </p:par>
+                            </p:childTnLst>
+                          </p:cTn>
+                        </p:par>
+                      </p:childTnLst>
+                    </p:cTn>
+                  </p:par>
+                  <p:par>
+                    <p:cTn id="18" fill="hold">
+                      <p:stCondLst>
+                        <p:cond delay="indefinite"/>
+                      </p:stCondLst>
+                      <p:childTnLst>
+                        <p:par>
+                          <p:cTn id="19" fill="hold">
+                            <p:stCondLst>
+                              <p:cond delay="0"/>
+                            </p:stCondLst>
+                            <p:childTnLst>
+                              <p:par>
+                                <p:cTn id="20" presetID="10" presetClass="entr" presetSubtype="0" fill="hold" nodeType="clickEffect">
+                                  <p:stCondLst>
+                                    <p:cond delay="0"/>
+                                  </p:stCondLst>
+                                  <p:childTnLst>
+                                    <p:set>
+                                      <p:cBhvr>
+                                        <p:cTn id="21" dur="1" fill="hold">
+                                          <p:stCondLst>
+                                            <p:cond delay="0"/>
+                                          </p:stCondLst>
+                                        </p:cTn>
+                                        <p:tgtEl>
+                                          <p:spTgt spid="4">
+                                            <p:txEl>
+                                              <p:pRg st="3" end="3"/>
+                                            </p:txEl>
+                                          </p:spTgt>
+                                        </p:tgtEl>
+                                        <p:attrNameLst>
+                                          <p:attrName>style.visibility</p:attrName>
+                                        </p:attrNameLst>
+                                      </p:cBhvr>
+                                      <p:to>
+                                        <p:strVal val="visible"/>
+                                      </p:to>
+                                    </p:set>
+                                    <p:animEffect transition="in" filter="fade">
+                                      <p:cBhvr>
+                                        <p:cTn id="22" dur="500"/>
+                                        <p:tgtEl>
+                                          <p:spTgt spid="4">
+                                            <p:txEl>
+                                              <p:pRg st="3" end="3"/>
+                                            </p:txEl>
+                                          </p:spTgt>
+                                        </p:tgtEl>
+                                      </p:cBhvr>
+                                    </p:animEffect>
+                                  </p:childTnLst>
+                                </p:cTn>
+                              </p:par>
+                            </p:childTnLst>
+                          </p:cTn>
+                        </p:par>
+                      </p:childTnLst>
+                    </p:cTn>
+                  </p:par>
+                  <p:par>
+                    <p:cTn id="23" fill="hold">
+                      <p:stCondLst>
+                        <p:cond delay="indefinite"/>
+                      </p:stCondLst>
+                      <p:childTnLst>
+                        <p:par>
+                          <p:cTn id="24" fill="hold">
+                            <p:stCondLst>
+                              <p:cond delay="0"/>
+                            </p:stCondLst>
+                            <p:childTnLst>
+                              <p:par>
+                                <p:cTn id="25" presetID="10" presetClass="entr" presetSubtype="0" fill="hold" nodeType="clickEffect">
+                                  <p:stCondLst>
+                                    <p:cond delay="0"/>
+                                  </p:stCondLst>
+                                  <p:childTnLst>
+                                    <p:set>
+                                      <p:cBhvr>
+                                        <p:cTn id="26" dur="1" fill="hold">
+                                          <p:stCondLst>
+                                            <p:cond delay="0"/>
+                                          </p:stCondLst>
+                                        </p:cTn>
+                                        <p:tgtEl>
+                                          <p:spTgt spid="4">
+                                            <p:txEl>
+                                              <p:pRg st="4" end="4"/>
+                                            </p:txEl>
+                                          </p:spTgt>
+                                        </p:tgtEl>
+                                        <p:attrNameLst>
+                                          <p:attrName>style.visibility</p:attrName>
+                                        </p:attrNameLst>
+                                      </p:cBhvr>
+                                      <p:to>
+                                        <p:strVal val="visible"/>
+                                      </p:to>
+                                    </p:set>
+                                    <p:animEffect transition="in" filter="fade">
+                                      <p:cBhvr>
+                                        <p:cTn id="27" dur="500"/>
+                                        <p:tgtEl>
+                                          <p:spTgt spid="4">
+                                            <p:txEl>
+                                              <p:pRg st="4" end="4"/>
+                                            </p:txEl>
+                                          </p:spTgt>
+                                        </p:tgtEl>
+                                      </p:cBhvr>
+                                    </p:animEffect>
+                                  </p:childTnLst>
+                                </p:cTn>
+                              </p:par>
+                            </p:childTnLst>
+                          </p:cTn>
+                        </p:par>
+                      </p:childTnLst>
+                    </p:cTn>
+                  </p:par>
+                  <p:par>
+                    <p:cTn id="28" fill="hold">
+                      <p:stCondLst>
+                        <p:cond delay="indefinite"/>
+                      </p:stCondLst>
+                      <p:childTnLst>
+                        <p:par>
+                          <p:cTn id="29" fill="hold">
+                            <p:stCondLst>
+                              <p:cond delay="0"/>
+                            </p:stCondLst>
+                            <p:childTnLst>
+                              <p:par>
+                                <p:cTn id="30" presetID="10" presetClass="entr" presetSubtype="0" fill="hold" nodeType="clickEffect">
+                                  <p:stCondLst>
+                                    <p:cond delay="0"/>
+                                  </p:stCondLst>
+                                  <p:childTnLst>
+                                    <p:set>
+                                      <p:cBhvr>
+                                        <p:cTn id="31" dur="1" fill="hold">
+                                          <p:stCondLst>
+                                            <p:cond delay="0"/>
+                                          </p:stCondLst>
+                                        </p:cTn>
+                                        <p:tgtEl>
+                                          <p:spTgt spid="7"/>
+                                        </p:tgtEl>
+                                        <p:attrNameLst>
+                                          <p:attrName>style.visibility</p:attrName>
+                                        </p:attrNameLst>
+                                      </p:cBhvr>
+                                      <p:to>
+                                        <p:strVal val="visible"/>
+                                      </p:to>
+                                    </p:set>
+                                    <p:animEffect transition="in" filter="fade">
+                                      <p:cBhvr>
+                                        <p:cTn id="32" dur="500"/>
+                                        <p:tgtEl>
+                                          <p:spTgt spid="7"/>
+                                        </p:tgtEl>
+                                      </p:cBhvr>
+                                    </p:animEffect>
+                                  </p:childTnLst>
+                                </p:cTn>
+                              </p:par>
+                            </p:childTnLst>
+                          </p:cTn>
+                        </p:par>
+                      </p:childTnLst>
+                    </p:cTn>
+                  </p:par>
+                </p:childTnLst>
+              </p:cTn>
+              <p:prevCondLst>
+                <p:cond evt="onPrev" delay="0">
+                  <p:tgtEl>
+                    <p:sldTgt/>
+                  </p:tgtEl>
+                </p:cond>
+              </p:prevCondLst>
+              <p:nextCondLst>
+                <p:cond evt="onNext" delay="0">
+                  <p:tgtEl>
+                    <p:sldTgt/>
+                  </p:tgtEl>
+                </p:cond>
+              </p:nextCondLst>
+            </p:seq>
+          </p:childTnLst>
+        </p:cTn>
+      </p:par>
+    </p:tnLst>
+  </p:timing>
 </p:sld>
 </file>
 
@@ -9691,7 +10628,17 @@
             </a:pPr>
             <a:r>
               <a:rPr lang="en-US" sz="3200" dirty="0"/>
-              <a:t>Demo</a:t>
+              <a:t>Demo: </a:t>
+            </a:r>
+            <a:r>
+              <a:rPr lang="en-US" sz="3200" dirty="0">
+                <a:hlinkClick r:id="rId3"/>
+              </a:rPr>
+              <a:t>https://tinyurl.com/dtupou</a:t>
+            </a:r>
+            <a:r>
+              <a:rPr lang="en-US" sz="3200" dirty="0"/>
+              <a:t> </a:t>
             </a:r>
           </a:p>
         </p:txBody>
@@ -9731,6 +10678,269 @@
   <p:clrMapOvr>
     <a:masterClrMapping/>
   </p:clrMapOvr>
+  <p:timing>
+    <p:tnLst>
+      <p:par>
+        <p:cTn id="1" dur="indefinite" restart="never" nodeType="tmRoot">
+          <p:childTnLst>
+            <p:seq concurrent="1" nextAc="seek">
+              <p:cTn id="2" dur="indefinite" nodeType="mainSeq">
+                <p:childTnLst>
+                  <p:par>
+                    <p:cTn id="3" fill="hold">
+                      <p:stCondLst>
+                        <p:cond delay="indefinite"/>
+                      </p:stCondLst>
+                      <p:childTnLst>
+                        <p:par>
+                          <p:cTn id="4" fill="hold">
+                            <p:stCondLst>
+                              <p:cond delay="0"/>
+                            </p:stCondLst>
+                            <p:childTnLst>
+                              <p:par>
+                                <p:cTn id="5" presetID="10" presetClass="entr" presetSubtype="0" fill="hold" nodeType="clickEffect">
+                                  <p:stCondLst>
+                                    <p:cond delay="0"/>
+                                  </p:stCondLst>
+                                  <p:childTnLst>
+                                    <p:set>
+                                      <p:cBhvr>
+                                        <p:cTn id="6" dur="1" fill="hold">
+                                          <p:stCondLst>
+                                            <p:cond delay="0"/>
+                                          </p:stCondLst>
+                                        </p:cTn>
+                                        <p:tgtEl>
+                                          <p:spTgt spid="4">
+                                            <p:txEl>
+                                              <p:pRg st="0" end="0"/>
+                                            </p:txEl>
+                                          </p:spTgt>
+                                        </p:tgtEl>
+                                        <p:attrNameLst>
+                                          <p:attrName>style.visibility</p:attrName>
+                                        </p:attrNameLst>
+                                      </p:cBhvr>
+                                      <p:to>
+                                        <p:strVal val="visible"/>
+                                      </p:to>
+                                    </p:set>
+                                    <p:animEffect transition="in" filter="fade">
+                                      <p:cBhvr>
+                                        <p:cTn id="7" dur="500"/>
+                                        <p:tgtEl>
+                                          <p:spTgt spid="4">
+                                            <p:txEl>
+                                              <p:pRg st="0" end="0"/>
+                                            </p:txEl>
+                                          </p:spTgt>
+                                        </p:tgtEl>
+                                      </p:cBhvr>
+                                    </p:animEffect>
+                                  </p:childTnLst>
+                                </p:cTn>
+                              </p:par>
+                              <p:par>
+                                <p:cTn id="8" presetID="10" presetClass="entr" presetSubtype="0" fill="hold" nodeType="withEffect">
+                                  <p:stCondLst>
+                                    <p:cond delay="0"/>
+                                  </p:stCondLst>
+                                  <p:childTnLst>
+                                    <p:set>
+                                      <p:cBhvr>
+                                        <p:cTn id="9" dur="1" fill="hold">
+                                          <p:stCondLst>
+                                            <p:cond delay="0"/>
+                                          </p:stCondLst>
+                                        </p:cTn>
+                                        <p:tgtEl>
+                                          <p:spTgt spid="4">
+                                            <p:txEl>
+                                              <p:pRg st="1" end="1"/>
+                                            </p:txEl>
+                                          </p:spTgt>
+                                        </p:tgtEl>
+                                        <p:attrNameLst>
+                                          <p:attrName>style.visibility</p:attrName>
+                                        </p:attrNameLst>
+                                      </p:cBhvr>
+                                      <p:to>
+                                        <p:strVal val="visible"/>
+                                      </p:to>
+                                    </p:set>
+                                    <p:animEffect transition="in" filter="fade">
+                                      <p:cBhvr>
+                                        <p:cTn id="10" dur="500"/>
+                                        <p:tgtEl>
+                                          <p:spTgt spid="4">
+                                            <p:txEl>
+                                              <p:pRg st="1" end="1"/>
+                                            </p:txEl>
+                                          </p:spTgt>
+                                        </p:tgtEl>
+                                      </p:cBhvr>
+                                    </p:animEffect>
+                                  </p:childTnLst>
+                                </p:cTn>
+                              </p:par>
+                              <p:par>
+                                <p:cTn id="11" presetID="10" presetClass="entr" presetSubtype="0" fill="hold" nodeType="withEffect">
+                                  <p:stCondLst>
+                                    <p:cond delay="0"/>
+                                  </p:stCondLst>
+                                  <p:childTnLst>
+                                    <p:set>
+                                      <p:cBhvr>
+                                        <p:cTn id="12" dur="1" fill="hold">
+                                          <p:stCondLst>
+                                            <p:cond delay="0"/>
+                                          </p:stCondLst>
+                                        </p:cTn>
+                                        <p:tgtEl>
+                                          <p:spTgt spid="4">
+                                            <p:txEl>
+                                              <p:pRg st="2" end="2"/>
+                                            </p:txEl>
+                                          </p:spTgt>
+                                        </p:tgtEl>
+                                        <p:attrNameLst>
+                                          <p:attrName>style.visibility</p:attrName>
+                                        </p:attrNameLst>
+                                      </p:cBhvr>
+                                      <p:to>
+                                        <p:strVal val="visible"/>
+                                      </p:to>
+                                    </p:set>
+                                    <p:animEffect transition="in" filter="fade">
+                                      <p:cBhvr>
+                                        <p:cTn id="13" dur="500"/>
+                                        <p:tgtEl>
+                                          <p:spTgt spid="4">
+                                            <p:txEl>
+                                              <p:pRg st="2" end="2"/>
+                                            </p:txEl>
+                                          </p:spTgt>
+                                        </p:tgtEl>
+                                      </p:cBhvr>
+                                    </p:animEffect>
+                                  </p:childTnLst>
+                                </p:cTn>
+                              </p:par>
+                              <p:par>
+                                <p:cTn id="14" presetID="10" presetClass="entr" presetSubtype="0" fill="hold" nodeType="withEffect">
+                                  <p:stCondLst>
+                                    <p:cond delay="0"/>
+                                  </p:stCondLst>
+                                  <p:childTnLst>
+                                    <p:set>
+                                      <p:cBhvr>
+                                        <p:cTn id="15" dur="1" fill="hold">
+                                          <p:stCondLst>
+                                            <p:cond delay="0"/>
+                                          </p:stCondLst>
+                                        </p:cTn>
+                                        <p:tgtEl>
+                                          <p:spTgt spid="4">
+                                            <p:txEl>
+                                              <p:pRg st="3" end="3"/>
+                                            </p:txEl>
+                                          </p:spTgt>
+                                        </p:tgtEl>
+                                        <p:attrNameLst>
+                                          <p:attrName>style.visibility</p:attrName>
+                                        </p:attrNameLst>
+                                      </p:cBhvr>
+                                      <p:to>
+                                        <p:strVal val="visible"/>
+                                      </p:to>
+                                    </p:set>
+                                    <p:animEffect transition="in" filter="fade">
+                                      <p:cBhvr>
+                                        <p:cTn id="16" dur="500"/>
+                                        <p:tgtEl>
+                                          <p:spTgt spid="4">
+                                            <p:txEl>
+                                              <p:pRg st="3" end="3"/>
+                                            </p:txEl>
+                                          </p:spTgt>
+                                        </p:tgtEl>
+                                      </p:cBhvr>
+                                    </p:animEffect>
+                                  </p:childTnLst>
+                                </p:cTn>
+                              </p:par>
+                              <p:par>
+                                <p:cTn id="17" presetID="10" presetClass="entr" presetSubtype="0" fill="hold" nodeType="withEffect">
+                                  <p:stCondLst>
+                                    <p:cond delay="0"/>
+                                  </p:stCondLst>
+                                  <p:childTnLst>
+                                    <p:set>
+                                      <p:cBhvr>
+                                        <p:cTn id="18" dur="1" fill="hold">
+                                          <p:stCondLst>
+                                            <p:cond delay="0"/>
+                                          </p:stCondLst>
+                                        </p:cTn>
+                                        <p:tgtEl>
+                                          <p:spTgt spid="4">
+                                            <p:txEl>
+                                              <p:pRg st="4" end="4"/>
+                                            </p:txEl>
+                                          </p:spTgt>
+                                        </p:tgtEl>
+                                        <p:attrNameLst>
+                                          <p:attrName>style.visibility</p:attrName>
+                                        </p:attrNameLst>
+                                      </p:cBhvr>
+                                      <p:to>
+                                        <p:strVal val="visible"/>
+                                      </p:to>
+                                    </p:set>
+                                    <p:animEffect transition="in" filter="fade">
+                                      <p:cBhvr>
+                                        <p:cTn id="19" dur="500"/>
+                                        <p:tgtEl>
+                                          <p:spTgt spid="4">
+                                            <p:txEl>
+                                              <p:pRg st="4" end="4"/>
+                                            </p:txEl>
+                                          </p:spTgt>
+                                        </p:tgtEl>
+                                      </p:cBhvr>
+                                    </p:animEffect>
+                                  </p:childTnLst>
+                                </p:cTn>
+                              </p:par>
+                            </p:childTnLst>
+                          </p:cTn>
+                        </p:par>
+                      </p:childTnLst>
+                    </p:cTn>
+                  </p:par>
+                </p:childTnLst>
+              </p:cTn>
+              <p:prevCondLst>
+                <p:cond evt="onPrev" delay="0">
+                  <p:tgtEl>
+                    <p:sldTgt/>
+                  </p:tgtEl>
+                </p:cond>
+              </p:prevCondLst>
+              <p:nextCondLst>
+                <p:cond evt="onNext" delay="0">
+                  <p:tgtEl>
+                    <p:sldTgt/>
+                  </p:tgtEl>
+                </p:cond>
+              </p:nextCondLst>
+            </p:seq>
+          </p:childTnLst>
+        </p:cTn>
+      </p:par>
+    </p:tnLst>
+  </p:timing>
 </p:sld>
 </file>
 
@@ -9802,8 +11012,8 @@
         </p:nvSpPr>
         <p:spPr>
           <a:xfrm>
-            <a:off x="1154112" y="1982374"/>
-            <a:ext cx="5105400" cy="1859996"/>
+            <a:off x="163512" y="1982374"/>
+            <a:ext cx="6096000" cy="3232167"/>
           </a:xfrm>
           <a:prstGeom prst="rect">
             <a:avLst/>
@@ -9852,12 +11062,51 @@
             <a:r>
               <a:rPr lang="en-US" sz="2800" dirty="0">
                 <a:cs typeface="Consolas"/>
+              </a:rPr>
+              <a:t>Here is the reference code </a:t>
+            </a:r>
+            <a:r>
+              <a:rPr lang="en-US" sz="2800" dirty="0">
+                <a:cs typeface="Consolas"/>
                 <a:hlinkClick r:id="rId3"/>
               </a:rPr>
               <a:t>https://www.weatherapi.com/docs/weather_conditions.json</a:t>
             </a:r>
             <a:r>
               <a:rPr lang="en-US" sz="2800" dirty="0">
+                <a:cs typeface="Consolas"/>
+              </a:rPr>
+              <a:t> </a:t>
+            </a:r>
+          </a:p>
+          <a:p>
+            <a:pPr marL="469900" marR="5080" indent="-457200">
+              <a:lnSpc>
+                <a:spcPts val="3350"/>
+              </a:lnSpc>
+              <a:spcBef>
+                <a:spcPts val="515"/>
+              </a:spcBef>
+              <a:buFont typeface="Arial" panose="020B0604020202020204" pitchFamily="34" charset="0"/>
+              <a:buChar char="•"/>
+              <a:tabLst>
+                <a:tab pos="241300" algn="l"/>
+              </a:tabLst>
+            </a:pPr>
+            <a:r>
+              <a:rPr lang="en-US" sz="2800" dirty="0">
+                <a:cs typeface="Consolas"/>
+              </a:rPr>
+              <a:t>We will put the co inside </a:t>
+            </a:r>
+            <a:r>
+              <a:rPr lang="en-US" sz="2800" b="1" dirty="0" err="1">
+                <a:cs typeface="Consolas"/>
+              </a:rPr>
+              <a:t>StateManager.cs</a:t>
+            </a:r>
+            <a:r>
+              <a:rPr lang="en-US" sz="2800" b="1" dirty="0">
                 <a:cs typeface="Consolas"/>
               </a:rPr>
               <a:t> </a:t>
@@ -10644,6 +11893,251 @@
       </p:grpSpPr>
       <p:sp>
         <p:nvSpPr>
+          <p:cNvPr id="2" name="object 2"/>
+          <p:cNvSpPr txBox="1">
+            <a:spLocks noGrp="1"/>
+          </p:cNvSpPr>
+          <p:nvPr>
+            <p:ph type="title"/>
+          </p:nvPr>
+        </p:nvSpPr>
+        <p:spPr>
+          <a:xfrm>
+            <a:off x="1306512" y="1032861"/>
+            <a:ext cx="11049000" cy="712118"/>
+          </a:xfrm>
+          <a:prstGeom prst="rect">
+            <a:avLst/>
+          </a:prstGeom>
+        </p:spPr>
+        <p:txBody>
+          <a:bodyPr vert="horz" wrap="square" lIns="0" tIns="13970" rIns="0" bIns="0" rtlCol="0" anchor="b">
+            <a:spAutoFit/>
+          </a:bodyPr>
+          <a:lstStyle/>
+          <a:p>
+            <a:pPr marL="12700">
+              <a:spcBef>
+                <a:spcPts val="110"/>
+              </a:spcBef>
+            </a:pPr>
+            <a:r>
+              <a:rPr lang="en-US" spc="5" dirty="0"/>
+              <a:t>Summary </a:t>
+            </a:r>
+          </a:p>
+        </p:txBody>
+      </p:sp>
+      <p:sp>
+        <p:nvSpPr>
+          <p:cNvPr id="3" name="object 3">
+            <a:extLst>
+              <a:ext uri="{FF2B5EF4-FFF2-40B4-BE49-F238E27FC236}">
+                <a16:creationId xmlns:a16="http://schemas.microsoft.com/office/drawing/2014/main" id="{B4C6B685-4CC5-126E-FC65-A52DD7950497}"/>
+              </a:ext>
+            </a:extLst>
+          </p:cNvPr>
+          <p:cNvSpPr txBox="1"/>
+          <p:nvPr/>
+        </p:nvSpPr>
+        <p:spPr>
+          <a:xfrm>
+            <a:off x="1154112" y="1982374"/>
+            <a:ext cx="11201400" cy="4796698"/>
+          </a:xfrm>
+          <a:prstGeom prst="rect">
+            <a:avLst/>
+          </a:prstGeom>
+        </p:spPr>
+        <p:txBody>
+          <a:bodyPr vert="horz" wrap="square" lIns="0" tIns="65405" rIns="0" bIns="0" rtlCol="0">
+            <a:spAutoFit/>
+          </a:bodyPr>
+          <a:lstStyle/>
+          <a:p>
+            <a:pPr marL="469900" marR="5080" indent="-457200">
+              <a:lnSpc>
+                <a:spcPts val="3350"/>
+              </a:lnSpc>
+              <a:spcBef>
+                <a:spcPts val="515"/>
+              </a:spcBef>
+              <a:buFont typeface="Arial" panose="020B0604020202020204" pitchFamily="34" charset="0"/>
+              <a:buChar char="•"/>
+              <a:tabLst>
+                <a:tab pos="241300" algn="l"/>
+              </a:tabLst>
+            </a:pPr>
+            <a:r>
+              <a:rPr lang="en-US" sz="2800" spc="-10" dirty="0">
+                <a:cs typeface="Calibri"/>
+              </a:rPr>
+              <a:t>A digital twin is a virtual model designed to accurately reflect a physical object, process, or system.</a:t>
+            </a:r>
+          </a:p>
+          <a:p>
+            <a:pPr marL="469900" marR="5080" indent="-457200">
+              <a:lnSpc>
+                <a:spcPts val="3350"/>
+              </a:lnSpc>
+              <a:spcBef>
+                <a:spcPts val="515"/>
+              </a:spcBef>
+              <a:buFont typeface="Arial" panose="020B0604020202020204" pitchFamily="34" charset="0"/>
+              <a:buChar char="•"/>
+              <a:tabLst>
+                <a:tab pos="241300" algn="l"/>
+              </a:tabLst>
+            </a:pPr>
+            <a:r>
+              <a:rPr lang="en-US" sz="2800" dirty="0">
+                <a:cs typeface="Consolas"/>
+              </a:rPr>
+              <a:t>digital twin software has five different levels of sophistication.</a:t>
+            </a:r>
+          </a:p>
+          <a:p>
+            <a:pPr marL="469900" marR="5080" indent="-457200">
+              <a:lnSpc>
+                <a:spcPts val="3350"/>
+              </a:lnSpc>
+              <a:spcBef>
+                <a:spcPts val="515"/>
+              </a:spcBef>
+              <a:buFont typeface="Arial" panose="020B0604020202020204" pitchFamily="34" charset="0"/>
+              <a:buChar char="•"/>
+              <a:tabLst>
+                <a:tab pos="241300" algn="l"/>
+              </a:tabLst>
+            </a:pPr>
+            <a:r>
+              <a:rPr lang="en-US" sz="2800" dirty="0">
+                <a:cs typeface="Consolas"/>
+              </a:rPr>
+              <a:t>Application layer communication protocols for DT can classified to 2 categories by its communication model </a:t>
+            </a:r>
+          </a:p>
+          <a:p>
+            <a:pPr marL="927100" marR="5080" lvl="1" indent="-457200">
+              <a:lnSpc>
+                <a:spcPts val="3350"/>
+              </a:lnSpc>
+              <a:spcBef>
+                <a:spcPts val="515"/>
+              </a:spcBef>
+              <a:buFont typeface="Arial" panose="020B0604020202020204" pitchFamily="34" charset="0"/>
+              <a:buChar char="•"/>
+              <a:tabLst>
+                <a:tab pos="241300" algn="l"/>
+              </a:tabLst>
+            </a:pPr>
+            <a:r>
+              <a:rPr lang="en-US" sz="2800" dirty="0">
+                <a:cs typeface="Consolas"/>
+              </a:rPr>
+              <a:t>Request/response</a:t>
+            </a:r>
+          </a:p>
+          <a:p>
+            <a:pPr marL="927100" marR="5080" lvl="1" indent="-457200">
+              <a:lnSpc>
+                <a:spcPts val="3350"/>
+              </a:lnSpc>
+              <a:spcBef>
+                <a:spcPts val="515"/>
+              </a:spcBef>
+              <a:buFont typeface="Arial" panose="020B0604020202020204" pitchFamily="34" charset="0"/>
+              <a:buChar char="•"/>
+              <a:tabLst>
+                <a:tab pos="241300" algn="l"/>
+              </a:tabLst>
+            </a:pPr>
+            <a:r>
+              <a:rPr lang="en-US" sz="2800" dirty="0">
+                <a:cs typeface="Consolas"/>
+              </a:rPr>
+              <a:t>Publish/subscribe (pub-sub)</a:t>
+            </a:r>
+          </a:p>
+          <a:p>
+            <a:pPr marL="469900" marR="5080" indent="-457200">
+              <a:lnSpc>
+                <a:spcPts val="3350"/>
+              </a:lnSpc>
+              <a:spcBef>
+                <a:spcPts val="515"/>
+              </a:spcBef>
+              <a:buFont typeface="Arial" panose="020B0604020202020204" pitchFamily="34" charset="0"/>
+              <a:buChar char="•"/>
+              <a:tabLst>
+                <a:tab pos="241300" algn="l"/>
+              </a:tabLst>
+            </a:pPr>
+            <a:r>
+              <a:rPr lang="en-US" sz="2800" dirty="0" err="1">
+                <a:cs typeface="Consolas"/>
+              </a:rPr>
+              <a:t>UnityWebRequest</a:t>
+            </a:r>
+            <a:r>
+              <a:rPr lang="en-US" sz="2800" dirty="0">
+                <a:cs typeface="Consolas"/>
+              </a:rPr>
+              <a:t> is a powerful Unity API that allows developers to interact with web services and APIs through HTTP protocol.</a:t>
+            </a:r>
+          </a:p>
+          <a:p>
+            <a:pPr marL="469900" marR="5080" indent="-457200">
+              <a:lnSpc>
+                <a:spcPts val="3350"/>
+              </a:lnSpc>
+              <a:spcBef>
+                <a:spcPts val="515"/>
+              </a:spcBef>
+              <a:buFont typeface="Arial" panose="020B0604020202020204" pitchFamily="34" charset="0"/>
+              <a:buChar char="•"/>
+              <a:tabLst>
+                <a:tab pos="241300" algn="l"/>
+              </a:tabLst>
+            </a:pPr>
+            <a:endParaRPr lang="en-US" sz="2800" b="1" dirty="0">
+              <a:cs typeface="Consolas"/>
+            </a:endParaRPr>
+          </a:p>
+        </p:txBody>
+      </p:sp>
+    </p:spTree>
+    <p:extLst>
+      <p:ext uri="{BB962C8B-B14F-4D97-AF65-F5344CB8AC3E}">
+        <p14:creationId xmlns:p14="http://schemas.microsoft.com/office/powerpoint/2010/main" val="2469541779"/>
+      </p:ext>
+    </p:extLst>
+  </p:cSld>
+  <p:clrMapOvr>
+    <a:masterClrMapping/>
+  </p:clrMapOvr>
+</p:sld>
+</file>
+
+<file path=ppt/slides/slide24.xml><?xml version="1.0" encoding="utf-8"?>
+<p:sld xmlns:a="http://schemas.openxmlformats.org/drawingml/2006/main" xmlns:r="http://schemas.openxmlformats.org/officeDocument/2006/relationships" xmlns:p="http://schemas.openxmlformats.org/presentationml/2006/main">
+  <p:cSld>
+    <p:spTree>
+      <p:nvGrpSpPr>
+        <p:cNvPr id="1" name=""/>
+        <p:cNvGrpSpPr/>
+        <p:nvPr/>
+      </p:nvGrpSpPr>
+      <p:grpSpPr>
+        <a:xfrm>
+          <a:off x="0" y="0"/>
+          <a:ext cx="0" cy="0"/>
+          <a:chOff x="0" y="0"/>
+          <a:chExt cx="0" cy="0"/>
+        </a:xfrm>
+      </p:grpSpPr>
+      <p:sp>
+        <p:nvSpPr>
           <p:cNvPr id="3" name="object 3"/>
           <p:cNvSpPr txBox="1"/>
           <p:nvPr/>
@@ -11044,6 +12538,463 @@
   <p:clrMapOvr>
     <a:masterClrMapping/>
   </p:clrMapOvr>
+  <p:timing>
+    <p:tnLst>
+      <p:par>
+        <p:cTn id="1" dur="indefinite" restart="never" nodeType="tmRoot">
+          <p:childTnLst>
+            <p:seq concurrent="1" nextAc="seek">
+              <p:cTn id="2" dur="indefinite" nodeType="mainSeq">
+                <p:childTnLst>
+                  <p:par>
+                    <p:cTn id="3" fill="hold">
+                      <p:stCondLst>
+                        <p:cond delay="indefinite"/>
+                      </p:stCondLst>
+                      <p:childTnLst>
+                        <p:par>
+                          <p:cTn id="4" fill="hold">
+                            <p:stCondLst>
+                              <p:cond delay="0"/>
+                            </p:stCondLst>
+                            <p:childTnLst>
+                              <p:par>
+                                <p:cTn id="5" presetID="10" presetClass="entr" presetSubtype="0" fill="hold" nodeType="clickEffect">
+                                  <p:stCondLst>
+                                    <p:cond delay="0"/>
+                                  </p:stCondLst>
+                                  <p:childTnLst>
+                                    <p:set>
+                                      <p:cBhvr>
+                                        <p:cTn id="6" dur="1" fill="hold">
+                                          <p:stCondLst>
+                                            <p:cond delay="0"/>
+                                          </p:stCondLst>
+                                        </p:cTn>
+                                        <p:tgtEl>
+                                          <p:spTgt spid="4">
+                                            <p:txEl>
+                                              <p:pRg st="0" end="0"/>
+                                            </p:txEl>
+                                          </p:spTgt>
+                                        </p:tgtEl>
+                                        <p:attrNameLst>
+                                          <p:attrName>style.visibility</p:attrName>
+                                        </p:attrNameLst>
+                                      </p:cBhvr>
+                                      <p:to>
+                                        <p:strVal val="visible"/>
+                                      </p:to>
+                                    </p:set>
+                                    <p:animEffect transition="in" filter="fade">
+                                      <p:cBhvr>
+                                        <p:cTn id="7" dur="500"/>
+                                        <p:tgtEl>
+                                          <p:spTgt spid="4">
+                                            <p:txEl>
+                                              <p:pRg st="0" end="0"/>
+                                            </p:txEl>
+                                          </p:spTgt>
+                                        </p:tgtEl>
+                                      </p:cBhvr>
+                                    </p:animEffect>
+                                  </p:childTnLst>
+                                </p:cTn>
+                              </p:par>
+                            </p:childTnLst>
+                          </p:cTn>
+                        </p:par>
+                      </p:childTnLst>
+                    </p:cTn>
+                  </p:par>
+                  <p:par>
+                    <p:cTn id="8" fill="hold">
+                      <p:stCondLst>
+                        <p:cond delay="indefinite"/>
+                      </p:stCondLst>
+                      <p:childTnLst>
+                        <p:par>
+                          <p:cTn id="9" fill="hold">
+                            <p:stCondLst>
+                              <p:cond delay="0"/>
+                            </p:stCondLst>
+                            <p:childTnLst>
+                              <p:par>
+                                <p:cTn id="10" presetID="10" presetClass="entr" presetSubtype="0" fill="hold" nodeType="clickEffect">
+                                  <p:stCondLst>
+                                    <p:cond delay="0"/>
+                                  </p:stCondLst>
+                                  <p:childTnLst>
+                                    <p:set>
+                                      <p:cBhvr>
+                                        <p:cTn id="11" dur="1" fill="hold">
+                                          <p:stCondLst>
+                                            <p:cond delay="0"/>
+                                          </p:stCondLst>
+                                        </p:cTn>
+                                        <p:tgtEl>
+                                          <p:spTgt spid="4">
+                                            <p:txEl>
+                                              <p:pRg st="1" end="1"/>
+                                            </p:txEl>
+                                          </p:spTgt>
+                                        </p:tgtEl>
+                                        <p:attrNameLst>
+                                          <p:attrName>style.visibility</p:attrName>
+                                        </p:attrNameLst>
+                                      </p:cBhvr>
+                                      <p:to>
+                                        <p:strVal val="visible"/>
+                                      </p:to>
+                                    </p:set>
+                                    <p:animEffect transition="in" filter="fade">
+                                      <p:cBhvr>
+                                        <p:cTn id="12" dur="500"/>
+                                        <p:tgtEl>
+                                          <p:spTgt spid="4">
+                                            <p:txEl>
+                                              <p:pRg st="1" end="1"/>
+                                            </p:txEl>
+                                          </p:spTgt>
+                                        </p:tgtEl>
+                                      </p:cBhvr>
+                                    </p:animEffect>
+                                  </p:childTnLst>
+                                </p:cTn>
+                              </p:par>
+                            </p:childTnLst>
+                          </p:cTn>
+                        </p:par>
+                      </p:childTnLst>
+                    </p:cTn>
+                  </p:par>
+                  <p:par>
+                    <p:cTn id="13" fill="hold">
+                      <p:stCondLst>
+                        <p:cond delay="indefinite"/>
+                      </p:stCondLst>
+                      <p:childTnLst>
+                        <p:par>
+                          <p:cTn id="14" fill="hold">
+                            <p:stCondLst>
+                              <p:cond delay="0"/>
+                            </p:stCondLst>
+                            <p:childTnLst>
+                              <p:par>
+                                <p:cTn id="15" presetID="10" presetClass="entr" presetSubtype="0" fill="hold" nodeType="clickEffect">
+                                  <p:stCondLst>
+                                    <p:cond delay="0"/>
+                                  </p:stCondLst>
+                                  <p:childTnLst>
+                                    <p:set>
+                                      <p:cBhvr>
+                                        <p:cTn id="16" dur="1" fill="hold">
+                                          <p:stCondLst>
+                                            <p:cond delay="0"/>
+                                          </p:stCondLst>
+                                        </p:cTn>
+                                        <p:tgtEl>
+                                          <p:spTgt spid="4">
+                                            <p:txEl>
+                                              <p:pRg st="2" end="2"/>
+                                            </p:txEl>
+                                          </p:spTgt>
+                                        </p:tgtEl>
+                                        <p:attrNameLst>
+                                          <p:attrName>style.visibility</p:attrName>
+                                        </p:attrNameLst>
+                                      </p:cBhvr>
+                                      <p:to>
+                                        <p:strVal val="visible"/>
+                                      </p:to>
+                                    </p:set>
+                                    <p:animEffect transition="in" filter="fade">
+                                      <p:cBhvr>
+                                        <p:cTn id="17" dur="500"/>
+                                        <p:tgtEl>
+                                          <p:spTgt spid="4">
+                                            <p:txEl>
+                                              <p:pRg st="2" end="2"/>
+                                            </p:txEl>
+                                          </p:spTgt>
+                                        </p:tgtEl>
+                                      </p:cBhvr>
+                                    </p:animEffect>
+                                  </p:childTnLst>
+                                </p:cTn>
+                              </p:par>
+                            </p:childTnLst>
+                          </p:cTn>
+                        </p:par>
+                      </p:childTnLst>
+                    </p:cTn>
+                  </p:par>
+                  <p:par>
+                    <p:cTn id="18" fill="hold">
+                      <p:stCondLst>
+                        <p:cond delay="indefinite"/>
+                      </p:stCondLst>
+                      <p:childTnLst>
+                        <p:par>
+                          <p:cTn id="19" fill="hold">
+                            <p:stCondLst>
+                              <p:cond delay="0"/>
+                            </p:stCondLst>
+                            <p:childTnLst>
+                              <p:par>
+                                <p:cTn id="20" presetID="10" presetClass="entr" presetSubtype="0" fill="hold" nodeType="clickEffect">
+                                  <p:stCondLst>
+                                    <p:cond delay="0"/>
+                                  </p:stCondLst>
+                                  <p:childTnLst>
+                                    <p:set>
+                                      <p:cBhvr>
+                                        <p:cTn id="21" dur="1" fill="hold">
+                                          <p:stCondLst>
+                                            <p:cond delay="0"/>
+                                          </p:stCondLst>
+                                        </p:cTn>
+                                        <p:tgtEl>
+                                          <p:spTgt spid="4">
+                                            <p:txEl>
+                                              <p:pRg st="3" end="3"/>
+                                            </p:txEl>
+                                          </p:spTgt>
+                                        </p:tgtEl>
+                                        <p:attrNameLst>
+                                          <p:attrName>style.visibility</p:attrName>
+                                        </p:attrNameLst>
+                                      </p:cBhvr>
+                                      <p:to>
+                                        <p:strVal val="visible"/>
+                                      </p:to>
+                                    </p:set>
+                                    <p:animEffect transition="in" filter="fade">
+                                      <p:cBhvr>
+                                        <p:cTn id="22" dur="500"/>
+                                        <p:tgtEl>
+                                          <p:spTgt spid="4">
+                                            <p:txEl>
+                                              <p:pRg st="3" end="3"/>
+                                            </p:txEl>
+                                          </p:spTgt>
+                                        </p:tgtEl>
+                                      </p:cBhvr>
+                                    </p:animEffect>
+                                  </p:childTnLst>
+                                </p:cTn>
+                              </p:par>
+                            </p:childTnLst>
+                          </p:cTn>
+                        </p:par>
+                      </p:childTnLst>
+                    </p:cTn>
+                  </p:par>
+                  <p:par>
+                    <p:cTn id="23" fill="hold">
+                      <p:stCondLst>
+                        <p:cond delay="indefinite"/>
+                      </p:stCondLst>
+                      <p:childTnLst>
+                        <p:par>
+                          <p:cTn id="24" fill="hold">
+                            <p:stCondLst>
+                              <p:cond delay="0"/>
+                            </p:stCondLst>
+                            <p:childTnLst>
+                              <p:par>
+                                <p:cTn id="25" presetID="10" presetClass="entr" presetSubtype="0" fill="hold" nodeType="clickEffect">
+                                  <p:stCondLst>
+                                    <p:cond delay="0"/>
+                                  </p:stCondLst>
+                                  <p:childTnLst>
+                                    <p:set>
+                                      <p:cBhvr>
+                                        <p:cTn id="26" dur="1" fill="hold">
+                                          <p:stCondLst>
+                                            <p:cond delay="0"/>
+                                          </p:stCondLst>
+                                        </p:cTn>
+                                        <p:tgtEl>
+                                          <p:spTgt spid="4">
+                                            <p:txEl>
+                                              <p:pRg st="4" end="4"/>
+                                            </p:txEl>
+                                          </p:spTgt>
+                                        </p:tgtEl>
+                                        <p:attrNameLst>
+                                          <p:attrName>style.visibility</p:attrName>
+                                        </p:attrNameLst>
+                                      </p:cBhvr>
+                                      <p:to>
+                                        <p:strVal val="visible"/>
+                                      </p:to>
+                                    </p:set>
+                                    <p:animEffect transition="in" filter="fade">
+                                      <p:cBhvr>
+                                        <p:cTn id="27" dur="500"/>
+                                        <p:tgtEl>
+                                          <p:spTgt spid="4">
+                                            <p:txEl>
+                                              <p:pRg st="4" end="4"/>
+                                            </p:txEl>
+                                          </p:spTgt>
+                                        </p:tgtEl>
+                                      </p:cBhvr>
+                                    </p:animEffect>
+                                  </p:childTnLst>
+                                </p:cTn>
+                              </p:par>
+                            </p:childTnLst>
+                          </p:cTn>
+                        </p:par>
+                      </p:childTnLst>
+                    </p:cTn>
+                  </p:par>
+                  <p:par>
+                    <p:cTn id="28" fill="hold">
+                      <p:stCondLst>
+                        <p:cond delay="indefinite"/>
+                      </p:stCondLst>
+                      <p:childTnLst>
+                        <p:par>
+                          <p:cTn id="29" fill="hold">
+                            <p:stCondLst>
+                              <p:cond delay="0"/>
+                            </p:stCondLst>
+                            <p:childTnLst>
+                              <p:par>
+                                <p:cTn id="30" presetID="10" presetClass="entr" presetSubtype="0" fill="hold" nodeType="clickEffect">
+                                  <p:stCondLst>
+                                    <p:cond delay="0"/>
+                                  </p:stCondLst>
+                                  <p:childTnLst>
+                                    <p:set>
+                                      <p:cBhvr>
+                                        <p:cTn id="31" dur="1" fill="hold">
+                                          <p:stCondLst>
+                                            <p:cond delay="0"/>
+                                          </p:stCondLst>
+                                        </p:cTn>
+                                        <p:tgtEl>
+                                          <p:spTgt spid="4">
+                                            <p:txEl>
+                                              <p:pRg st="5" end="5"/>
+                                            </p:txEl>
+                                          </p:spTgt>
+                                        </p:tgtEl>
+                                        <p:attrNameLst>
+                                          <p:attrName>style.visibility</p:attrName>
+                                        </p:attrNameLst>
+                                      </p:cBhvr>
+                                      <p:to>
+                                        <p:strVal val="visible"/>
+                                      </p:to>
+                                    </p:set>
+                                    <p:animEffect transition="in" filter="fade">
+                                      <p:cBhvr>
+                                        <p:cTn id="32" dur="500"/>
+                                        <p:tgtEl>
+                                          <p:spTgt spid="4">
+                                            <p:txEl>
+                                              <p:pRg st="5" end="5"/>
+                                            </p:txEl>
+                                          </p:spTgt>
+                                        </p:tgtEl>
+                                      </p:cBhvr>
+                                    </p:animEffect>
+                                  </p:childTnLst>
+                                </p:cTn>
+                              </p:par>
+                            </p:childTnLst>
+                          </p:cTn>
+                        </p:par>
+                      </p:childTnLst>
+                    </p:cTn>
+                  </p:par>
+                  <p:par>
+                    <p:cTn id="33" fill="hold">
+                      <p:stCondLst>
+                        <p:cond delay="indefinite"/>
+                      </p:stCondLst>
+                      <p:childTnLst>
+                        <p:par>
+                          <p:cTn id="34" fill="hold">
+                            <p:stCondLst>
+                              <p:cond delay="0"/>
+                            </p:stCondLst>
+                            <p:childTnLst>
+                              <p:par>
+                                <p:cTn id="35" presetID="10" presetClass="entr" presetSubtype="0" fill="hold" nodeType="clickEffect">
+                                  <p:stCondLst>
+                                    <p:cond delay="0"/>
+                                  </p:stCondLst>
+                                  <p:childTnLst>
+                                    <p:set>
+                                      <p:cBhvr>
+                                        <p:cTn id="36" dur="1" fill="hold">
+                                          <p:stCondLst>
+                                            <p:cond delay="0"/>
+                                          </p:stCondLst>
+                                        </p:cTn>
+                                        <p:tgtEl>
+                                          <p:spTgt spid="4">
+                                            <p:txEl>
+                                              <p:pRg st="6" end="6"/>
+                                            </p:txEl>
+                                          </p:spTgt>
+                                        </p:tgtEl>
+                                        <p:attrNameLst>
+                                          <p:attrName>style.visibility</p:attrName>
+                                        </p:attrNameLst>
+                                      </p:cBhvr>
+                                      <p:to>
+                                        <p:strVal val="visible"/>
+                                      </p:to>
+                                    </p:set>
+                                    <p:animEffect transition="in" filter="fade">
+                                      <p:cBhvr>
+                                        <p:cTn id="37" dur="500"/>
+                                        <p:tgtEl>
+                                          <p:spTgt spid="4">
+                                            <p:txEl>
+                                              <p:pRg st="6" end="6"/>
+                                            </p:txEl>
+                                          </p:spTgt>
+                                        </p:tgtEl>
+                                      </p:cBhvr>
+                                    </p:animEffect>
+                                  </p:childTnLst>
+                                </p:cTn>
+                              </p:par>
+                            </p:childTnLst>
+                          </p:cTn>
+                        </p:par>
+                      </p:childTnLst>
+                    </p:cTn>
+                  </p:par>
+                </p:childTnLst>
+              </p:cTn>
+              <p:prevCondLst>
+                <p:cond evt="onPrev" delay="0">
+                  <p:tgtEl>
+                    <p:sldTgt/>
+                  </p:tgtEl>
+                </p:cond>
+              </p:prevCondLst>
+              <p:nextCondLst>
+                <p:cond evt="onNext" delay="0">
+                  <p:tgtEl>
+                    <p:sldTgt/>
+                  </p:tgtEl>
+                </p:cond>
+              </p:nextCondLst>
+            </p:seq>
+          </p:childTnLst>
+        </p:cTn>
+      </p:par>
+    </p:tnLst>
+  </p:timing>
 </p:sld>
 </file>
 
@@ -11269,6 +13220,280 @@
   <p:clrMapOvr>
     <a:masterClrMapping/>
   </p:clrMapOvr>
+  <p:timing>
+    <p:tnLst>
+      <p:par>
+        <p:cTn id="1" dur="indefinite" restart="never" nodeType="tmRoot">
+          <p:childTnLst>
+            <p:seq concurrent="1" nextAc="seek">
+              <p:cTn id="2" dur="indefinite" nodeType="mainSeq">
+                <p:childTnLst>
+                  <p:par>
+                    <p:cTn id="3" fill="hold">
+                      <p:stCondLst>
+                        <p:cond delay="indefinite"/>
+                      </p:stCondLst>
+                      <p:childTnLst>
+                        <p:par>
+                          <p:cTn id="4" fill="hold">
+                            <p:stCondLst>
+                              <p:cond delay="0"/>
+                            </p:stCondLst>
+                            <p:childTnLst>
+                              <p:par>
+                                <p:cTn id="5" presetID="10" presetClass="entr" presetSubtype="0" fill="hold" nodeType="clickEffect">
+                                  <p:stCondLst>
+                                    <p:cond delay="0"/>
+                                  </p:stCondLst>
+                                  <p:childTnLst>
+                                    <p:set>
+                                      <p:cBhvr>
+                                        <p:cTn id="6" dur="1" fill="hold">
+                                          <p:stCondLst>
+                                            <p:cond delay="0"/>
+                                          </p:stCondLst>
+                                        </p:cTn>
+                                        <p:tgtEl>
+                                          <p:spTgt spid="4">
+                                            <p:txEl>
+                                              <p:pRg st="0" end="0"/>
+                                            </p:txEl>
+                                          </p:spTgt>
+                                        </p:tgtEl>
+                                        <p:attrNameLst>
+                                          <p:attrName>style.visibility</p:attrName>
+                                        </p:attrNameLst>
+                                      </p:cBhvr>
+                                      <p:to>
+                                        <p:strVal val="visible"/>
+                                      </p:to>
+                                    </p:set>
+                                    <p:animEffect transition="in" filter="fade">
+                                      <p:cBhvr>
+                                        <p:cTn id="7" dur="500"/>
+                                        <p:tgtEl>
+                                          <p:spTgt spid="4">
+                                            <p:txEl>
+                                              <p:pRg st="0" end="0"/>
+                                            </p:txEl>
+                                          </p:spTgt>
+                                        </p:tgtEl>
+                                      </p:cBhvr>
+                                    </p:animEffect>
+                                  </p:childTnLst>
+                                </p:cTn>
+                              </p:par>
+                            </p:childTnLst>
+                          </p:cTn>
+                        </p:par>
+                      </p:childTnLst>
+                    </p:cTn>
+                  </p:par>
+                  <p:par>
+                    <p:cTn id="8" fill="hold">
+                      <p:stCondLst>
+                        <p:cond delay="indefinite"/>
+                      </p:stCondLst>
+                      <p:childTnLst>
+                        <p:par>
+                          <p:cTn id="9" fill="hold">
+                            <p:stCondLst>
+                              <p:cond delay="0"/>
+                            </p:stCondLst>
+                            <p:childTnLst>
+                              <p:par>
+                                <p:cTn id="10" presetID="10" presetClass="entr" presetSubtype="0" fill="hold" nodeType="clickEffect">
+                                  <p:stCondLst>
+                                    <p:cond delay="0"/>
+                                  </p:stCondLst>
+                                  <p:childTnLst>
+                                    <p:set>
+                                      <p:cBhvr>
+                                        <p:cTn id="11" dur="1" fill="hold">
+                                          <p:stCondLst>
+                                            <p:cond delay="0"/>
+                                          </p:stCondLst>
+                                        </p:cTn>
+                                        <p:tgtEl>
+                                          <p:spTgt spid="4">
+                                            <p:txEl>
+                                              <p:pRg st="1" end="1"/>
+                                            </p:txEl>
+                                          </p:spTgt>
+                                        </p:tgtEl>
+                                        <p:attrNameLst>
+                                          <p:attrName>style.visibility</p:attrName>
+                                        </p:attrNameLst>
+                                      </p:cBhvr>
+                                      <p:to>
+                                        <p:strVal val="visible"/>
+                                      </p:to>
+                                    </p:set>
+                                    <p:animEffect transition="in" filter="fade">
+                                      <p:cBhvr>
+                                        <p:cTn id="12" dur="500"/>
+                                        <p:tgtEl>
+                                          <p:spTgt spid="4">
+                                            <p:txEl>
+                                              <p:pRg st="1" end="1"/>
+                                            </p:txEl>
+                                          </p:spTgt>
+                                        </p:tgtEl>
+                                      </p:cBhvr>
+                                    </p:animEffect>
+                                  </p:childTnLst>
+                                </p:cTn>
+                              </p:par>
+                            </p:childTnLst>
+                          </p:cTn>
+                        </p:par>
+                      </p:childTnLst>
+                    </p:cTn>
+                  </p:par>
+                  <p:par>
+                    <p:cTn id="13" fill="hold">
+                      <p:stCondLst>
+                        <p:cond delay="indefinite"/>
+                      </p:stCondLst>
+                      <p:childTnLst>
+                        <p:par>
+                          <p:cTn id="14" fill="hold">
+                            <p:stCondLst>
+                              <p:cond delay="0"/>
+                            </p:stCondLst>
+                            <p:childTnLst>
+                              <p:par>
+                                <p:cTn id="15" presetID="10" presetClass="entr" presetSubtype="0" fill="hold" nodeType="clickEffect">
+                                  <p:stCondLst>
+                                    <p:cond delay="0"/>
+                                  </p:stCondLst>
+                                  <p:childTnLst>
+                                    <p:set>
+                                      <p:cBhvr>
+                                        <p:cTn id="16" dur="1" fill="hold">
+                                          <p:stCondLst>
+                                            <p:cond delay="0"/>
+                                          </p:stCondLst>
+                                        </p:cTn>
+                                        <p:tgtEl>
+                                          <p:spTgt spid="4">
+                                            <p:txEl>
+                                              <p:pRg st="2" end="2"/>
+                                            </p:txEl>
+                                          </p:spTgt>
+                                        </p:tgtEl>
+                                        <p:attrNameLst>
+                                          <p:attrName>style.visibility</p:attrName>
+                                        </p:attrNameLst>
+                                      </p:cBhvr>
+                                      <p:to>
+                                        <p:strVal val="visible"/>
+                                      </p:to>
+                                    </p:set>
+                                    <p:animEffect transition="in" filter="fade">
+                                      <p:cBhvr>
+                                        <p:cTn id="17" dur="500"/>
+                                        <p:tgtEl>
+                                          <p:spTgt spid="4">
+                                            <p:txEl>
+                                              <p:pRg st="2" end="2"/>
+                                            </p:txEl>
+                                          </p:spTgt>
+                                        </p:tgtEl>
+                                      </p:cBhvr>
+                                    </p:animEffect>
+                                  </p:childTnLst>
+                                </p:cTn>
+                              </p:par>
+                            </p:childTnLst>
+                          </p:cTn>
+                        </p:par>
+                      </p:childTnLst>
+                    </p:cTn>
+                  </p:par>
+                  <p:par>
+                    <p:cTn id="18" fill="hold">
+                      <p:stCondLst>
+                        <p:cond delay="indefinite"/>
+                      </p:stCondLst>
+                      <p:childTnLst>
+                        <p:par>
+                          <p:cTn id="19" fill="hold">
+                            <p:stCondLst>
+                              <p:cond delay="0"/>
+                            </p:stCondLst>
+                            <p:childTnLst>
+                              <p:par>
+                                <p:cTn id="20" presetID="10" presetClass="entr" presetSubtype="0" fill="hold" nodeType="clickEffect">
+                                  <p:stCondLst>
+                                    <p:cond delay="0"/>
+                                  </p:stCondLst>
+                                  <p:childTnLst>
+                                    <p:set>
+                                      <p:cBhvr>
+                                        <p:cTn id="21" dur="1" fill="hold">
+                                          <p:stCondLst>
+                                            <p:cond delay="0"/>
+                                          </p:stCondLst>
+                                        </p:cTn>
+                                        <p:tgtEl>
+                                          <p:spTgt spid="4">
+                                            <p:txEl>
+                                              <p:pRg st="3" end="3"/>
+                                            </p:txEl>
+                                          </p:spTgt>
+                                        </p:tgtEl>
+                                        <p:attrNameLst>
+                                          <p:attrName>style.visibility</p:attrName>
+                                        </p:attrNameLst>
+                                      </p:cBhvr>
+                                      <p:to>
+                                        <p:strVal val="visible"/>
+                                      </p:to>
+                                    </p:set>
+                                    <p:animEffect transition="in" filter="fade">
+                                      <p:cBhvr>
+                                        <p:cTn id="22" dur="500"/>
+                                        <p:tgtEl>
+                                          <p:spTgt spid="4">
+                                            <p:txEl>
+                                              <p:pRg st="3" end="3"/>
+                                            </p:txEl>
+                                          </p:spTgt>
+                                        </p:tgtEl>
+                                      </p:cBhvr>
+                                    </p:animEffect>
+                                  </p:childTnLst>
+                                </p:cTn>
+                              </p:par>
+                            </p:childTnLst>
+                          </p:cTn>
+                        </p:par>
+                      </p:childTnLst>
+                    </p:cTn>
+                  </p:par>
+                </p:childTnLst>
+              </p:cTn>
+              <p:prevCondLst>
+                <p:cond evt="onPrev" delay="0">
+                  <p:tgtEl>
+                    <p:sldTgt/>
+                  </p:tgtEl>
+                </p:cond>
+              </p:prevCondLst>
+              <p:nextCondLst>
+                <p:cond evt="onNext" delay="0">
+                  <p:tgtEl>
+                    <p:sldTgt/>
+                  </p:tgtEl>
+                </p:cond>
+              </p:nextCondLst>
+            </p:seq>
+          </p:childTnLst>
+        </p:cTn>
+      </p:par>
+    </p:tnLst>
+  </p:timing>
 </p:sld>
 </file>
 
@@ -11369,7 +13594,7 @@
               <a:rPr lang="en-US" sz="2800" spc="-10" dirty="0">
                 <a:cs typeface="Calibri"/>
               </a:rPr>
-              <a:t> application layer communication protocols for DT can classified to 2 categories by its communication model </a:t>
+              <a:t>Application layer communication protocols for DT can classified to 2 categories by its communication model </a:t>
             </a:r>
           </a:p>
           <a:p>
@@ -11520,6 +13745,325 @@
   <p:clrMapOvr>
     <a:masterClrMapping/>
   </p:clrMapOvr>
+  <p:timing>
+    <p:tnLst>
+      <p:par>
+        <p:cTn id="1" dur="indefinite" restart="never" nodeType="tmRoot">
+          <p:childTnLst>
+            <p:seq concurrent="1" nextAc="seek">
+              <p:cTn id="2" dur="indefinite" nodeType="mainSeq">
+                <p:childTnLst>
+                  <p:par>
+                    <p:cTn id="3" fill="hold">
+                      <p:stCondLst>
+                        <p:cond delay="indefinite"/>
+                      </p:stCondLst>
+                      <p:childTnLst>
+                        <p:par>
+                          <p:cTn id="4" fill="hold">
+                            <p:stCondLst>
+                              <p:cond delay="0"/>
+                            </p:stCondLst>
+                            <p:childTnLst>
+                              <p:par>
+                                <p:cTn id="5" presetID="10" presetClass="entr" presetSubtype="0" fill="hold" nodeType="clickEffect">
+                                  <p:stCondLst>
+                                    <p:cond delay="0"/>
+                                  </p:stCondLst>
+                                  <p:childTnLst>
+                                    <p:set>
+                                      <p:cBhvr>
+                                        <p:cTn id="6" dur="1" fill="hold">
+                                          <p:stCondLst>
+                                            <p:cond delay="0"/>
+                                          </p:stCondLst>
+                                        </p:cTn>
+                                        <p:tgtEl>
+                                          <p:spTgt spid="4">
+                                            <p:txEl>
+                                              <p:pRg st="0" end="0"/>
+                                            </p:txEl>
+                                          </p:spTgt>
+                                        </p:tgtEl>
+                                        <p:attrNameLst>
+                                          <p:attrName>style.visibility</p:attrName>
+                                        </p:attrNameLst>
+                                      </p:cBhvr>
+                                      <p:to>
+                                        <p:strVal val="visible"/>
+                                      </p:to>
+                                    </p:set>
+                                    <p:animEffect transition="in" filter="fade">
+                                      <p:cBhvr>
+                                        <p:cTn id="7" dur="500"/>
+                                        <p:tgtEl>
+                                          <p:spTgt spid="4">
+                                            <p:txEl>
+                                              <p:pRg st="0" end="0"/>
+                                            </p:txEl>
+                                          </p:spTgt>
+                                        </p:tgtEl>
+                                      </p:cBhvr>
+                                    </p:animEffect>
+                                  </p:childTnLst>
+                                </p:cTn>
+                              </p:par>
+                            </p:childTnLst>
+                          </p:cTn>
+                        </p:par>
+                      </p:childTnLst>
+                    </p:cTn>
+                  </p:par>
+                  <p:par>
+                    <p:cTn id="8" fill="hold">
+                      <p:stCondLst>
+                        <p:cond delay="indefinite"/>
+                      </p:stCondLst>
+                      <p:childTnLst>
+                        <p:par>
+                          <p:cTn id="9" fill="hold">
+                            <p:stCondLst>
+                              <p:cond delay="0"/>
+                            </p:stCondLst>
+                            <p:childTnLst>
+                              <p:par>
+                                <p:cTn id="10" presetID="10" presetClass="entr" presetSubtype="0" fill="hold" nodeType="clickEffect">
+                                  <p:stCondLst>
+                                    <p:cond delay="0"/>
+                                  </p:stCondLst>
+                                  <p:childTnLst>
+                                    <p:set>
+                                      <p:cBhvr>
+                                        <p:cTn id="11" dur="1" fill="hold">
+                                          <p:stCondLst>
+                                            <p:cond delay="0"/>
+                                          </p:stCondLst>
+                                        </p:cTn>
+                                        <p:tgtEl>
+                                          <p:spTgt spid="4">
+                                            <p:txEl>
+                                              <p:pRg st="1" end="1"/>
+                                            </p:txEl>
+                                          </p:spTgt>
+                                        </p:tgtEl>
+                                        <p:attrNameLst>
+                                          <p:attrName>style.visibility</p:attrName>
+                                        </p:attrNameLst>
+                                      </p:cBhvr>
+                                      <p:to>
+                                        <p:strVal val="visible"/>
+                                      </p:to>
+                                    </p:set>
+                                    <p:animEffect transition="in" filter="fade">
+                                      <p:cBhvr>
+                                        <p:cTn id="12" dur="500"/>
+                                        <p:tgtEl>
+                                          <p:spTgt spid="4">
+                                            <p:txEl>
+                                              <p:pRg st="1" end="1"/>
+                                            </p:txEl>
+                                          </p:spTgt>
+                                        </p:tgtEl>
+                                      </p:cBhvr>
+                                    </p:animEffect>
+                                  </p:childTnLst>
+                                </p:cTn>
+                              </p:par>
+                            </p:childTnLst>
+                          </p:cTn>
+                        </p:par>
+                      </p:childTnLst>
+                    </p:cTn>
+                  </p:par>
+                  <p:par>
+                    <p:cTn id="13" fill="hold">
+                      <p:stCondLst>
+                        <p:cond delay="indefinite"/>
+                      </p:stCondLst>
+                      <p:childTnLst>
+                        <p:par>
+                          <p:cTn id="14" fill="hold">
+                            <p:stCondLst>
+                              <p:cond delay="0"/>
+                            </p:stCondLst>
+                            <p:childTnLst>
+                              <p:par>
+                                <p:cTn id="15" presetID="10" presetClass="entr" presetSubtype="0" fill="hold" nodeType="clickEffect">
+                                  <p:stCondLst>
+                                    <p:cond delay="0"/>
+                                  </p:stCondLst>
+                                  <p:childTnLst>
+                                    <p:set>
+                                      <p:cBhvr>
+                                        <p:cTn id="16" dur="1" fill="hold">
+                                          <p:stCondLst>
+                                            <p:cond delay="0"/>
+                                          </p:stCondLst>
+                                        </p:cTn>
+                                        <p:tgtEl>
+                                          <p:spTgt spid="4098"/>
+                                        </p:tgtEl>
+                                        <p:attrNameLst>
+                                          <p:attrName>style.visibility</p:attrName>
+                                        </p:attrNameLst>
+                                      </p:cBhvr>
+                                      <p:to>
+                                        <p:strVal val="visible"/>
+                                      </p:to>
+                                    </p:set>
+                                    <p:animEffect transition="in" filter="fade">
+                                      <p:cBhvr>
+                                        <p:cTn id="17" dur="500"/>
+                                        <p:tgtEl>
+                                          <p:spTgt spid="4098"/>
+                                        </p:tgtEl>
+                                      </p:cBhvr>
+                                    </p:animEffect>
+                                  </p:childTnLst>
+                                </p:cTn>
+                              </p:par>
+                            </p:childTnLst>
+                          </p:cTn>
+                        </p:par>
+                      </p:childTnLst>
+                    </p:cTn>
+                  </p:par>
+                  <p:par>
+                    <p:cTn id="18" fill="hold">
+                      <p:stCondLst>
+                        <p:cond delay="indefinite"/>
+                      </p:stCondLst>
+                      <p:childTnLst>
+                        <p:par>
+                          <p:cTn id="19" fill="hold">
+                            <p:stCondLst>
+                              <p:cond delay="0"/>
+                            </p:stCondLst>
+                            <p:childTnLst>
+                              <p:par>
+                                <p:cTn id="20" presetID="10" presetClass="entr" presetSubtype="0" fill="hold" nodeType="clickEffect">
+                                  <p:stCondLst>
+                                    <p:cond delay="0"/>
+                                  </p:stCondLst>
+                                  <p:childTnLst>
+                                    <p:set>
+                                      <p:cBhvr>
+                                        <p:cTn id="21" dur="1" fill="hold">
+                                          <p:stCondLst>
+                                            <p:cond delay="0"/>
+                                          </p:stCondLst>
+                                        </p:cTn>
+                                        <p:tgtEl>
+                                          <p:spTgt spid="4">
+                                            <p:txEl>
+                                              <p:pRg st="2" end="2"/>
+                                            </p:txEl>
+                                          </p:spTgt>
+                                        </p:tgtEl>
+                                        <p:attrNameLst>
+                                          <p:attrName>style.visibility</p:attrName>
+                                        </p:attrNameLst>
+                                      </p:cBhvr>
+                                      <p:to>
+                                        <p:strVal val="visible"/>
+                                      </p:to>
+                                    </p:set>
+                                    <p:animEffect transition="in" filter="fade">
+                                      <p:cBhvr>
+                                        <p:cTn id="22" dur="500"/>
+                                        <p:tgtEl>
+                                          <p:spTgt spid="4">
+                                            <p:txEl>
+                                              <p:pRg st="2" end="2"/>
+                                            </p:txEl>
+                                          </p:spTgt>
+                                        </p:tgtEl>
+                                      </p:cBhvr>
+                                    </p:animEffect>
+                                  </p:childTnLst>
+                                </p:cTn>
+                              </p:par>
+                            </p:childTnLst>
+                          </p:cTn>
+                        </p:par>
+                      </p:childTnLst>
+                    </p:cTn>
+                  </p:par>
+                  <p:par>
+                    <p:cTn id="23" fill="hold">
+                      <p:stCondLst>
+                        <p:cond delay="indefinite"/>
+                      </p:stCondLst>
+                      <p:childTnLst>
+                        <p:par>
+                          <p:cTn id="24" fill="hold">
+                            <p:stCondLst>
+                              <p:cond delay="0"/>
+                            </p:stCondLst>
+                            <p:childTnLst>
+                              <p:par>
+                                <p:cTn id="25" presetID="10" presetClass="entr" presetSubtype="0" fill="hold" nodeType="clickEffect">
+                                  <p:stCondLst>
+                                    <p:cond delay="0"/>
+                                  </p:stCondLst>
+                                  <p:childTnLst>
+                                    <p:set>
+                                      <p:cBhvr>
+                                        <p:cTn id="26" dur="1" fill="hold">
+                                          <p:stCondLst>
+                                            <p:cond delay="0"/>
+                                          </p:stCondLst>
+                                        </p:cTn>
+                                        <p:tgtEl>
+                                          <p:spTgt spid="4102"/>
+                                        </p:tgtEl>
+                                        <p:attrNameLst>
+                                          <p:attrName>style.visibility</p:attrName>
+                                        </p:attrNameLst>
+                                      </p:cBhvr>
+                                      <p:to>
+                                        <p:strVal val="visible"/>
+                                      </p:to>
+                                    </p:set>
+                                    <p:animEffect transition="in" filter="fade">
+                                      <p:cBhvr>
+                                        <p:cTn id="27" dur="500"/>
+                                        <p:tgtEl>
+                                          <p:spTgt spid="4102"/>
+                                        </p:tgtEl>
+                                      </p:cBhvr>
+                                    </p:animEffect>
+                                  </p:childTnLst>
+                                </p:cTn>
+                              </p:par>
+                            </p:childTnLst>
+                          </p:cTn>
+                        </p:par>
+                      </p:childTnLst>
+                    </p:cTn>
+                  </p:par>
+                </p:childTnLst>
+              </p:cTn>
+              <p:prevCondLst>
+                <p:cond evt="onPrev" delay="0">
+                  <p:tgtEl>
+                    <p:sldTgt/>
+                  </p:tgtEl>
+                </p:cond>
+              </p:prevCondLst>
+              <p:nextCondLst>
+                <p:cond evt="onNext" delay="0">
+                  <p:tgtEl>
+                    <p:sldTgt/>
+                  </p:tgtEl>
+                </p:cond>
+              </p:nextCondLst>
+            </p:seq>
+          </p:childTnLst>
+        </p:cTn>
+      </p:par>
+    </p:tnLst>
+  </p:timing>
 </p:sld>
 </file>
 
@@ -11638,10 +14182,16 @@
               </a:tabLst>
             </a:pPr>
             <a:r>
+              <a:rPr lang="en-US" sz="2800" b="1" dirty="0">
+                <a:cs typeface="Consolas"/>
+              </a:rPr>
+              <a:t>HTTP (Hypertext Transfer Protocol) </a:t>
+            </a:r>
+            <a:r>
               <a:rPr lang="en-US" sz="2800" dirty="0">
                 <a:cs typeface="Consolas"/>
               </a:rPr>
-              <a:t>HTTP HTTP (Hypertext Transfer Protocol) is a widely used application layer protocol and a basic building block of the World Wide Web</a:t>
+              <a:t>is a widely used application layer protocol and a basic building block of the World Wide Web</a:t>
             </a:r>
           </a:p>
           <a:p>
@@ -11659,14 +14209,114 @@
               </a:tabLst>
             </a:pPr>
             <a:r>
+              <a:rPr lang="en-US" sz="2800" b="1" dirty="0">
+                <a:cs typeface="Consolas"/>
+              </a:rPr>
+              <a:t>CoAP (Constrained Application Protocol)</a:t>
+            </a:r>
+            <a:r>
               <a:rPr lang="en-US" sz="2800" dirty="0">
                 <a:cs typeface="Consolas"/>
               </a:rPr>
-              <a:t>CoAP (Constrained Application Protocol), is a request/response protocol.</a:t>
-            </a:r>
-          </a:p>
-        </p:txBody>
-      </p:sp>
+              <a:t>, is a request/response protocol.</a:t>
+            </a:r>
+          </a:p>
+        </p:txBody>
+      </p:sp>
+      <p:pic>
+        <p:nvPicPr>
+          <p:cNvPr id="1026" name="Picture 2">
+            <a:extLst>
+              <a:ext uri="{FF2B5EF4-FFF2-40B4-BE49-F238E27FC236}">
+                <a16:creationId xmlns:a16="http://schemas.microsoft.com/office/drawing/2014/main" id="{7A3266E5-E401-3DC5-B65E-129DC1D561AD}"/>
+              </a:ext>
+            </a:extLst>
+          </p:cNvPr>
+          <p:cNvPicPr>
+            <a:picLocks noChangeAspect="1" noChangeArrowheads="1"/>
+          </p:cNvPicPr>
+          <p:nvPr/>
+        </p:nvPicPr>
+        <p:blipFill>
+          <a:blip r:embed="rId3">
+            <a:extLst>
+              <a:ext uri="{28A0092B-C50C-407E-A947-70E740481C1C}">
+                <a14:useLocalDpi xmlns:a14="http://schemas.microsoft.com/office/drawing/2010/main" val="0"/>
+              </a:ext>
+            </a:extLst>
+          </a:blip>
+          <a:srcRect/>
+          <a:stretch>
+            <a:fillRect/>
+          </a:stretch>
+        </p:blipFill>
+        <p:spPr bwMode="auto">
+          <a:xfrm>
+            <a:off x="468312" y="4078037"/>
+            <a:ext cx="5638800" cy="2819400"/>
+          </a:xfrm>
+          <a:prstGeom prst="rect">
+            <a:avLst/>
+          </a:prstGeom>
+          <a:noFill/>
+          <a:extLst>
+            <a:ext uri="{909E8E84-426E-40DD-AFC4-6F175D3DCCD1}">
+              <a14:hiddenFill xmlns:a14="http://schemas.microsoft.com/office/drawing/2010/main">
+                <a:solidFill>
+                  <a:srgbClr val="FFFFFF"/>
+                </a:solidFill>
+              </a14:hiddenFill>
+            </a:ext>
+          </a:extLst>
+        </p:spPr>
+      </p:pic>
+      <p:pic>
+        <p:nvPicPr>
+          <p:cNvPr id="1034" name="Picture 10">
+            <a:extLst>
+              <a:ext uri="{FF2B5EF4-FFF2-40B4-BE49-F238E27FC236}">
+                <a16:creationId xmlns:a16="http://schemas.microsoft.com/office/drawing/2014/main" id="{A3879F3A-A063-A58B-EB70-E8E418A6012F}"/>
+              </a:ext>
+            </a:extLst>
+          </p:cNvPr>
+          <p:cNvPicPr>
+            <a:picLocks noChangeAspect="1" noChangeArrowheads="1"/>
+          </p:cNvPicPr>
+          <p:nvPr/>
+        </p:nvPicPr>
+        <p:blipFill>
+          <a:blip r:embed="rId4">
+            <a:extLst>
+              <a:ext uri="{28A0092B-C50C-407E-A947-70E740481C1C}">
+                <a14:useLocalDpi xmlns:a14="http://schemas.microsoft.com/office/drawing/2010/main" val="0"/>
+              </a:ext>
+            </a:extLst>
+          </a:blip>
+          <a:srcRect/>
+          <a:stretch>
+            <a:fillRect/>
+          </a:stretch>
+        </p:blipFill>
+        <p:spPr bwMode="auto">
+          <a:xfrm>
+            <a:off x="7478712" y="3879916"/>
+            <a:ext cx="5029201" cy="3017521"/>
+          </a:xfrm>
+          <a:prstGeom prst="rect">
+            <a:avLst/>
+          </a:prstGeom>
+          <a:noFill/>
+          <a:extLst>
+            <a:ext uri="{909E8E84-426E-40DD-AFC4-6F175D3DCCD1}">
+              <a14:hiddenFill xmlns:a14="http://schemas.microsoft.com/office/drawing/2010/main">
+                <a:solidFill>
+                  <a:srgbClr val="FFFFFF"/>
+                </a:solidFill>
+              </a14:hiddenFill>
+            </a:ext>
+          </a:extLst>
+        </p:spPr>
+      </p:pic>
     </p:spTree>
     <p:extLst>
       <p:ext uri="{BB962C8B-B14F-4D97-AF65-F5344CB8AC3E}">
@@ -11677,6 +14327,325 @@
   <p:clrMapOvr>
     <a:masterClrMapping/>
   </p:clrMapOvr>
+  <p:timing>
+    <p:tnLst>
+      <p:par>
+        <p:cTn id="1" dur="indefinite" restart="never" nodeType="tmRoot">
+          <p:childTnLst>
+            <p:seq concurrent="1" nextAc="seek">
+              <p:cTn id="2" dur="indefinite" nodeType="mainSeq">
+                <p:childTnLst>
+                  <p:par>
+                    <p:cTn id="3" fill="hold">
+                      <p:stCondLst>
+                        <p:cond delay="indefinite"/>
+                      </p:stCondLst>
+                      <p:childTnLst>
+                        <p:par>
+                          <p:cTn id="4" fill="hold">
+                            <p:stCondLst>
+                              <p:cond delay="0"/>
+                            </p:stCondLst>
+                            <p:childTnLst>
+                              <p:par>
+                                <p:cTn id="5" presetID="10" presetClass="entr" presetSubtype="0" fill="hold" nodeType="clickEffect">
+                                  <p:stCondLst>
+                                    <p:cond delay="0"/>
+                                  </p:stCondLst>
+                                  <p:childTnLst>
+                                    <p:set>
+                                      <p:cBhvr>
+                                        <p:cTn id="6" dur="1" fill="hold">
+                                          <p:stCondLst>
+                                            <p:cond delay="0"/>
+                                          </p:stCondLst>
+                                        </p:cTn>
+                                        <p:tgtEl>
+                                          <p:spTgt spid="4">
+                                            <p:txEl>
+                                              <p:pRg st="0" end="0"/>
+                                            </p:txEl>
+                                          </p:spTgt>
+                                        </p:tgtEl>
+                                        <p:attrNameLst>
+                                          <p:attrName>style.visibility</p:attrName>
+                                        </p:attrNameLst>
+                                      </p:cBhvr>
+                                      <p:to>
+                                        <p:strVal val="visible"/>
+                                      </p:to>
+                                    </p:set>
+                                    <p:animEffect transition="in" filter="fade">
+                                      <p:cBhvr>
+                                        <p:cTn id="7" dur="500"/>
+                                        <p:tgtEl>
+                                          <p:spTgt spid="4">
+                                            <p:txEl>
+                                              <p:pRg st="0" end="0"/>
+                                            </p:txEl>
+                                          </p:spTgt>
+                                        </p:tgtEl>
+                                      </p:cBhvr>
+                                    </p:animEffect>
+                                  </p:childTnLst>
+                                </p:cTn>
+                              </p:par>
+                            </p:childTnLst>
+                          </p:cTn>
+                        </p:par>
+                      </p:childTnLst>
+                    </p:cTn>
+                  </p:par>
+                  <p:par>
+                    <p:cTn id="8" fill="hold">
+                      <p:stCondLst>
+                        <p:cond delay="indefinite"/>
+                      </p:stCondLst>
+                      <p:childTnLst>
+                        <p:par>
+                          <p:cTn id="9" fill="hold">
+                            <p:stCondLst>
+                              <p:cond delay="0"/>
+                            </p:stCondLst>
+                            <p:childTnLst>
+                              <p:par>
+                                <p:cTn id="10" presetID="10" presetClass="entr" presetSubtype="0" fill="hold" nodeType="clickEffect">
+                                  <p:stCondLst>
+                                    <p:cond delay="0"/>
+                                  </p:stCondLst>
+                                  <p:childTnLst>
+                                    <p:set>
+                                      <p:cBhvr>
+                                        <p:cTn id="11" dur="1" fill="hold">
+                                          <p:stCondLst>
+                                            <p:cond delay="0"/>
+                                          </p:stCondLst>
+                                        </p:cTn>
+                                        <p:tgtEl>
+                                          <p:spTgt spid="4">
+                                            <p:txEl>
+                                              <p:pRg st="1" end="1"/>
+                                            </p:txEl>
+                                          </p:spTgt>
+                                        </p:tgtEl>
+                                        <p:attrNameLst>
+                                          <p:attrName>style.visibility</p:attrName>
+                                        </p:attrNameLst>
+                                      </p:cBhvr>
+                                      <p:to>
+                                        <p:strVal val="visible"/>
+                                      </p:to>
+                                    </p:set>
+                                    <p:animEffect transition="in" filter="fade">
+                                      <p:cBhvr>
+                                        <p:cTn id="12" dur="500"/>
+                                        <p:tgtEl>
+                                          <p:spTgt spid="4">
+                                            <p:txEl>
+                                              <p:pRg st="1" end="1"/>
+                                            </p:txEl>
+                                          </p:spTgt>
+                                        </p:tgtEl>
+                                      </p:cBhvr>
+                                    </p:animEffect>
+                                  </p:childTnLst>
+                                </p:cTn>
+                              </p:par>
+                            </p:childTnLst>
+                          </p:cTn>
+                        </p:par>
+                      </p:childTnLst>
+                    </p:cTn>
+                  </p:par>
+                  <p:par>
+                    <p:cTn id="13" fill="hold">
+                      <p:stCondLst>
+                        <p:cond delay="indefinite"/>
+                      </p:stCondLst>
+                      <p:childTnLst>
+                        <p:par>
+                          <p:cTn id="14" fill="hold">
+                            <p:stCondLst>
+                              <p:cond delay="0"/>
+                            </p:stCondLst>
+                            <p:childTnLst>
+                              <p:par>
+                                <p:cTn id="15" presetID="10" presetClass="entr" presetSubtype="0" fill="hold" nodeType="clickEffect">
+                                  <p:stCondLst>
+                                    <p:cond delay="0"/>
+                                  </p:stCondLst>
+                                  <p:childTnLst>
+                                    <p:set>
+                                      <p:cBhvr>
+                                        <p:cTn id="16" dur="1" fill="hold">
+                                          <p:stCondLst>
+                                            <p:cond delay="0"/>
+                                          </p:stCondLst>
+                                        </p:cTn>
+                                        <p:tgtEl>
+                                          <p:spTgt spid="1026"/>
+                                        </p:tgtEl>
+                                        <p:attrNameLst>
+                                          <p:attrName>style.visibility</p:attrName>
+                                        </p:attrNameLst>
+                                      </p:cBhvr>
+                                      <p:to>
+                                        <p:strVal val="visible"/>
+                                      </p:to>
+                                    </p:set>
+                                    <p:animEffect transition="in" filter="fade">
+                                      <p:cBhvr>
+                                        <p:cTn id="17" dur="500"/>
+                                        <p:tgtEl>
+                                          <p:spTgt spid="1026"/>
+                                        </p:tgtEl>
+                                      </p:cBhvr>
+                                    </p:animEffect>
+                                  </p:childTnLst>
+                                </p:cTn>
+                              </p:par>
+                            </p:childTnLst>
+                          </p:cTn>
+                        </p:par>
+                      </p:childTnLst>
+                    </p:cTn>
+                  </p:par>
+                  <p:par>
+                    <p:cTn id="18" fill="hold">
+                      <p:stCondLst>
+                        <p:cond delay="indefinite"/>
+                      </p:stCondLst>
+                      <p:childTnLst>
+                        <p:par>
+                          <p:cTn id="19" fill="hold">
+                            <p:stCondLst>
+                              <p:cond delay="0"/>
+                            </p:stCondLst>
+                            <p:childTnLst>
+                              <p:par>
+                                <p:cTn id="20" presetID="10" presetClass="entr" presetSubtype="0" fill="hold" nodeType="clickEffect">
+                                  <p:stCondLst>
+                                    <p:cond delay="0"/>
+                                  </p:stCondLst>
+                                  <p:childTnLst>
+                                    <p:set>
+                                      <p:cBhvr>
+                                        <p:cTn id="21" dur="1" fill="hold">
+                                          <p:stCondLst>
+                                            <p:cond delay="0"/>
+                                          </p:stCondLst>
+                                        </p:cTn>
+                                        <p:tgtEl>
+                                          <p:spTgt spid="4">
+                                            <p:txEl>
+                                              <p:pRg st="2" end="2"/>
+                                            </p:txEl>
+                                          </p:spTgt>
+                                        </p:tgtEl>
+                                        <p:attrNameLst>
+                                          <p:attrName>style.visibility</p:attrName>
+                                        </p:attrNameLst>
+                                      </p:cBhvr>
+                                      <p:to>
+                                        <p:strVal val="visible"/>
+                                      </p:to>
+                                    </p:set>
+                                    <p:animEffect transition="in" filter="fade">
+                                      <p:cBhvr>
+                                        <p:cTn id="22" dur="500"/>
+                                        <p:tgtEl>
+                                          <p:spTgt spid="4">
+                                            <p:txEl>
+                                              <p:pRg st="2" end="2"/>
+                                            </p:txEl>
+                                          </p:spTgt>
+                                        </p:tgtEl>
+                                      </p:cBhvr>
+                                    </p:animEffect>
+                                  </p:childTnLst>
+                                </p:cTn>
+                              </p:par>
+                            </p:childTnLst>
+                          </p:cTn>
+                        </p:par>
+                      </p:childTnLst>
+                    </p:cTn>
+                  </p:par>
+                  <p:par>
+                    <p:cTn id="23" fill="hold">
+                      <p:stCondLst>
+                        <p:cond delay="indefinite"/>
+                      </p:stCondLst>
+                      <p:childTnLst>
+                        <p:par>
+                          <p:cTn id="24" fill="hold">
+                            <p:stCondLst>
+                              <p:cond delay="0"/>
+                            </p:stCondLst>
+                            <p:childTnLst>
+                              <p:par>
+                                <p:cTn id="25" presetID="10" presetClass="entr" presetSubtype="0" fill="hold" nodeType="clickEffect">
+                                  <p:stCondLst>
+                                    <p:cond delay="0"/>
+                                  </p:stCondLst>
+                                  <p:childTnLst>
+                                    <p:set>
+                                      <p:cBhvr>
+                                        <p:cTn id="26" dur="1" fill="hold">
+                                          <p:stCondLst>
+                                            <p:cond delay="0"/>
+                                          </p:stCondLst>
+                                        </p:cTn>
+                                        <p:tgtEl>
+                                          <p:spTgt spid="1034"/>
+                                        </p:tgtEl>
+                                        <p:attrNameLst>
+                                          <p:attrName>style.visibility</p:attrName>
+                                        </p:attrNameLst>
+                                      </p:cBhvr>
+                                      <p:to>
+                                        <p:strVal val="visible"/>
+                                      </p:to>
+                                    </p:set>
+                                    <p:animEffect transition="in" filter="fade">
+                                      <p:cBhvr>
+                                        <p:cTn id="27" dur="500"/>
+                                        <p:tgtEl>
+                                          <p:spTgt spid="1034"/>
+                                        </p:tgtEl>
+                                      </p:cBhvr>
+                                    </p:animEffect>
+                                  </p:childTnLst>
+                                </p:cTn>
+                              </p:par>
+                            </p:childTnLst>
+                          </p:cTn>
+                        </p:par>
+                      </p:childTnLst>
+                    </p:cTn>
+                  </p:par>
+                </p:childTnLst>
+              </p:cTn>
+              <p:prevCondLst>
+                <p:cond evt="onPrev" delay="0">
+                  <p:tgtEl>
+                    <p:sldTgt/>
+                  </p:tgtEl>
+                </p:cond>
+              </p:prevCondLst>
+              <p:nextCondLst>
+                <p:cond evt="onNext" delay="0">
+                  <p:tgtEl>
+                    <p:sldTgt/>
+                  </p:tgtEl>
+                </p:cond>
+              </p:nextCondLst>
+            </p:seq>
+          </p:childTnLst>
+        </p:cTn>
+      </p:par>
+    </p:tnLst>
+  </p:timing>
 </p:sld>
 </file>
 
@@ -11750,7 +14719,7 @@
         <p:spPr>
           <a:xfrm>
             <a:off x="1306512" y="1949450"/>
-            <a:ext cx="11785537" cy="4732578"/>
+            <a:ext cx="11785537" cy="4232441"/>
           </a:xfrm>
           <a:prstGeom prst="rect">
             <a:avLst/>
@@ -11761,25 +14730,6 @@
             <a:spAutoFit/>
           </a:bodyPr>
           <a:lstStyle/>
-          <a:p>
-            <a:pPr marL="12700" marR="5080">
-              <a:lnSpc>
-                <a:spcPts val="3350"/>
-              </a:lnSpc>
-              <a:spcBef>
-                <a:spcPts val="515"/>
-              </a:spcBef>
-              <a:tabLst>
-                <a:tab pos="241300" algn="l"/>
-              </a:tabLst>
-            </a:pPr>
-            <a:r>
-              <a:rPr lang="en-US" sz="2800" spc="-10" dirty="0">
-                <a:cs typeface="Calibri"/>
-              </a:rPr>
-              <a:t>A digital twin system can use these protocol for communication</a:t>
-            </a:r>
-          </a:p>
           <a:p>
             <a:pPr marL="469900" marR="5080" indent="-457200">
               <a:lnSpc>
@@ -11795,10 +14745,16 @@
               </a:tabLst>
             </a:pPr>
             <a:r>
+              <a:rPr lang="en-US" sz="2800" b="1" dirty="0">
+                <a:cs typeface="Consolas"/>
+              </a:rPr>
+              <a:t>MQTT (Message Queuing Telemetry Transport) </a:t>
+            </a:r>
+            <a:r>
               <a:rPr lang="en-US" sz="2800" dirty="0">
                 <a:cs typeface="Consolas"/>
               </a:rPr>
-              <a:t>MQTT (Message Queuing Telemetry Transport) is a lightweight publisher/subscriber</a:t>
+              <a:t>is a lightweight publisher/subscriber</a:t>
             </a:r>
           </a:p>
           <a:p>
@@ -11816,10 +14772,16 @@
               </a:tabLst>
             </a:pPr>
             <a:r>
+              <a:rPr lang="en-US" sz="2800" b="1" dirty="0">
+                <a:cs typeface="Consolas"/>
+              </a:rPr>
+              <a:t>XMPP (Extensible Messaging and Presence Protocol) </a:t>
+            </a:r>
+            <a:r>
               <a:rPr lang="en-US" sz="2800" dirty="0">
                 <a:cs typeface="Consolas"/>
               </a:rPr>
-              <a:t>XMPP (Extensible Messaging and Presence Protocol) is commonly used communication and messaging protocol in IoT</a:t>
+              <a:t>is commonly used communication and messaging protocol in IoT</a:t>
             </a:r>
           </a:p>
           <a:p>
@@ -11837,10 +14799,16 @@
               </a:tabLst>
             </a:pPr>
             <a:r>
+              <a:rPr lang="en-US" sz="2800" b="1" dirty="0">
+                <a:cs typeface="Consolas"/>
+              </a:rPr>
+              <a:t>AMQP (Advanced Message Queuing Protocol) </a:t>
+            </a:r>
+            <a:r>
               <a:rPr lang="en-US" sz="2800" dirty="0">
                 <a:cs typeface="Consolas"/>
               </a:rPr>
-              <a:t>AMQP (Advanced Message Queuing Protocol) follows a publish/subscribe model &amp; Request/Response </a:t>
+              <a:t>follows a publish/subscribe model &amp; Request/Response </a:t>
             </a:r>
           </a:p>
           <a:p>
@@ -11858,10 +14826,16 @@
               </a:tabLst>
             </a:pPr>
             <a:r>
+              <a:rPr lang="en-US" sz="2800" b="1" dirty="0">
+                <a:cs typeface="Consolas"/>
+              </a:rPr>
+              <a:t>DDS (Data Distribution Service) </a:t>
+            </a:r>
+            <a:r>
               <a:rPr lang="en-US" sz="2800" dirty="0">
                 <a:cs typeface="Consolas"/>
               </a:rPr>
-              <a:t>DDS (Data Distribution Service) follows a publish-subscribe model </a:t>
+              <a:t>follows a publish-subscribe model </a:t>
             </a:r>
           </a:p>
           <a:p>
@@ -11879,10 +14853,16 @@
               </a:tabLst>
             </a:pPr>
             <a:r>
+              <a:rPr lang="en-US" sz="2800" b="1" dirty="0">
+                <a:cs typeface="Consolas"/>
+              </a:rPr>
+              <a:t>OPC UA (Open Platform Communications Unified Architecture) </a:t>
+            </a:r>
+            <a:r>
               <a:rPr lang="en-US" sz="2800" dirty="0">
                 <a:cs typeface="Consolas"/>
               </a:rPr>
-              <a:t>OPC UA (Open Platform Communications Unified Architecture) supports both Client/Server and Publish/Subscribe models. </a:t>
+              <a:t>supports both Client/Server and Publish/Subscribe models. </a:t>
             </a:r>
           </a:p>
         </p:txBody>
@@ -11897,6 +14877,341 @@
   <p:clrMapOvr>
     <a:masterClrMapping/>
   </p:clrMapOvr>
+  <p:timing>
+    <p:tnLst>
+      <p:par>
+        <p:cTn id="1" dur="indefinite" restart="never" nodeType="tmRoot">
+          <p:childTnLst>
+            <p:seq concurrent="1" nextAc="seek">
+              <p:cTn id="2" dur="indefinite" nodeType="mainSeq">
+                <p:childTnLst>
+                  <p:par>
+                    <p:cTn id="3" fill="hold">
+                      <p:stCondLst>
+                        <p:cond delay="indefinite"/>
+                      </p:stCondLst>
+                      <p:childTnLst>
+                        <p:par>
+                          <p:cTn id="4" fill="hold">
+                            <p:stCondLst>
+                              <p:cond delay="0"/>
+                            </p:stCondLst>
+                            <p:childTnLst>
+                              <p:par>
+                                <p:cTn id="5" presetID="10" presetClass="entr" presetSubtype="0" fill="hold" nodeType="clickEffect">
+                                  <p:stCondLst>
+                                    <p:cond delay="0"/>
+                                  </p:stCondLst>
+                                  <p:childTnLst>
+                                    <p:set>
+                                      <p:cBhvr>
+                                        <p:cTn id="6" dur="1" fill="hold">
+                                          <p:stCondLst>
+                                            <p:cond delay="0"/>
+                                          </p:stCondLst>
+                                        </p:cTn>
+                                        <p:tgtEl>
+                                          <p:spTgt spid="4">
+                                            <p:txEl>
+                                              <p:pRg st="0" end="0"/>
+                                            </p:txEl>
+                                          </p:spTgt>
+                                        </p:tgtEl>
+                                        <p:attrNameLst>
+                                          <p:attrName>style.visibility</p:attrName>
+                                        </p:attrNameLst>
+                                      </p:cBhvr>
+                                      <p:to>
+                                        <p:strVal val="visible"/>
+                                      </p:to>
+                                    </p:set>
+                                    <p:animEffect transition="in" filter="fade">
+                                      <p:cBhvr>
+                                        <p:cTn id="7" dur="500"/>
+                                        <p:tgtEl>
+                                          <p:spTgt spid="4">
+                                            <p:txEl>
+                                              <p:pRg st="0" end="0"/>
+                                            </p:txEl>
+                                          </p:spTgt>
+                                        </p:tgtEl>
+                                      </p:cBhvr>
+                                    </p:animEffect>
+                                  </p:childTnLst>
+                                </p:cTn>
+                              </p:par>
+                            </p:childTnLst>
+                          </p:cTn>
+                        </p:par>
+                      </p:childTnLst>
+                    </p:cTn>
+                  </p:par>
+                  <p:par>
+                    <p:cTn id="8" fill="hold">
+                      <p:stCondLst>
+                        <p:cond delay="indefinite"/>
+                      </p:stCondLst>
+                      <p:childTnLst>
+                        <p:par>
+                          <p:cTn id="9" fill="hold">
+                            <p:stCondLst>
+                              <p:cond delay="0"/>
+                            </p:stCondLst>
+                            <p:childTnLst>
+                              <p:par>
+                                <p:cTn id="10" presetID="10" presetClass="entr" presetSubtype="0" fill="hold" nodeType="clickEffect">
+                                  <p:stCondLst>
+                                    <p:cond delay="0"/>
+                                  </p:stCondLst>
+                                  <p:childTnLst>
+                                    <p:set>
+                                      <p:cBhvr>
+                                        <p:cTn id="11" dur="1" fill="hold">
+                                          <p:stCondLst>
+                                            <p:cond delay="0"/>
+                                          </p:stCondLst>
+                                        </p:cTn>
+                                        <p:tgtEl>
+                                          <p:spTgt spid="4">
+                                            <p:txEl>
+                                              <p:pRg st="1" end="1"/>
+                                            </p:txEl>
+                                          </p:spTgt>
+                                        </p:tgtEl>
+                                        <p:attrNameLst>
+                                          <p:attrName>style.visibility</p:attrName>
+                                        </p:attrNameLst>
+                                      </p:cBhvr>
+                                      <p:to>
+                                        <p:strVal val="visible"/>
+                                      </p:to>
+                                    </p:set>
+                                    <p:animEffect transition="in" filter="fade">
+                                      <p:cBhvr>
+                                        <p:cTn id="12" dur="500"/>
+                                        <p:tgtEl>
+                                          <p:spTgt spid="4">
+                                            <p:txEl>
+                                              <p:pRg st="1" end="1"/>
+                                            </p:txEl>
+                                          </p:spTgt>
+                                        </p:tgtEl>
+                                      </p:cBhvr>
+                                    </p:animEffect>
+                                  </p:childTnLst>
+                                </p:cTn>
+                              </p:par>
+                            </p:childTnLst>
+                          </p:cTn>
+                        </p:par>
+                      </p:childTnLst>
+                    </p:cTn>
+                  </p:par>
+                  <p:par>
+                    <p:cTn id="13" fill="hold">
+                      <p:stCondLst>
+                        <p:cond delay="indefinite"/>
+                      </p:stCondLst>
+                      <p:childTnLst>
+                        <p:par>
+                          <p:cTn id="14" fill="hold">
+                            <p:stCondLst>
+                              <p:cond delay="0"/>
+                            </p:stCondLst>
+                            <p:childTnLst>
+                              <p:par>
+                                <p:cTn id="15" presetID="10" presetClass="entr" presetSubtype="0" fill="hold" nodeType="clickEffect">
+                                  <p:stCondLst>
+                                    <p:cond delay="0"/>
+                                  </p:stCondLst>
+                                  <p:childTnLst>
+                                    <p:set>
+                                      <p:cBhvr>
+                                        <p:cTn id="16" dur="1" fill="hold">
+                                          <p:stCondLst>
+                                            <p:cond delay="0"/>
+                                          </p:stCondLst>
+                                        </p:cTn>
+                                        <p:tgtEl>
+                                          <p:spTgt spid="4">
+                                            <p:txEl>
+                                              <p:pRg st="2" end="2"/>
+                                            </p:txEl>
+                                          </p:spTgt>
+                                        </p:tgtEl>
+                                        <p:attrNameLst>
+                                          <p:attrName>style.visibility</p:attrName>
+                                        </p:attrNameLst>
+                                      </p:cBhvr>
+                                      <p:to>
+                                        <p:strVal val="visible"/>
+                                      </p:to>
+                                    </p:set>
+                                    <p:animEffect transition="in" filter="fade">
+                                      <p:cBhvr>
+                                        <p:cTn id="17" dur="500"/>
+                                        <p:tgtEl>
+                                          <p:spTgt spid="4">
+                                            <p:txEl>
+                                              <p:pRg st="2" end="2"/>
+                                            </p:txEl>
+                                          </p:spTgt>
+                                        </p:tgtEl>
+                                      </p:cBhvr>
+                                    </p:animEffect>
+                                  </p:childTnLst>
+                                </p:cTn>
+                              </p:par>
+                            </p:childTnLst>
+                          </p:cTn>
+                        </p:par>
+                      </p:childTnLst>
+                    </p:cTn>
+                  </p:par>
+                  <p:par>
+                    <p:cTn id="18" fill="hold">
+                      <p:stCondLst>
+                        <p:cond delay="indefinite"/>
+                      </p:stCondLst>
+                      <p:childTnLst>
+                        <p:par>
+                          <p:cTn id="19" fill="hold">
+                            <p:stCondLst>
+                              <p:cond delay="0"/>
+                            </p:stCondLst>
+                            <p:childTnLst>
+                              <p:par>
+                                <p:cTn id="20" presetID="10" presetClass="entr" presetSubtype="0" fill="hold" nodeType="clickEffect">
+                                  <p:stCondLst>
+                                    <p:cond delay="0"/>
+                                  </p:stCondLst>
+                                  <p:childTnLst>
+                                    <p:set>
+                                      <p:cBhvr>
+                                        <p:cTn id="21" dur="1" fill="hold">
+                                          <p:stCondLst>
+                                            <p:cond delay="0"/>
+                                          </p:stCondLst>
+                                        </p:cTn>
+                                        <p:tgtEl>
+                                          <p:spTgt spid="4">
+                                            <p:txEl>
+                                              <p:pRg st="3" end="3"/>
+                                            </p:txEl>
+                                          </p:spTgt>
+                                        </p:tgtEl>
+                                        <p:attrNameLst>
+                                          <p:attrName>style.visibility</p:attrName>
+                                        </p:attrNameLst>
+                                      </p:cBhvr>
+                                      <p:to>
+                                        <p:strVal val="visible"/>
+                                      </p:to>
+                                    </p:set>
+                                    <p:animEffect transition="in" filter="fade">
+                                      <p:cBhvr>
+                                        <p:cTn id="22" dur="500"/>
+                                        <p:tgtEl>
+                                          <p:spTgt spid="4">
+                                            <p:txEl>
+                                              <p:pRg st="3" end="3"/>
+                                            </p:txEl>
+                                          </p:spTgt>
+                                        </p:tgtEl>
+                                      </p:cBhvr>
+                                    </p:animEffect>
+                                  </p:childTnLst>
+                                </p:cTn>
+                              </p:par>
+                            </p:childTnLst>
+                          </p:cTn>
+                        </p:par>
+                      </p:childTnLst>
+                    </p:cTn>
+                  </p:par>
+                  <p:par>
+                    <p:cTn id="23" fill="hold">
+                      <p:stCondLst>
+                        <p:cond delay="indefinite"/>
+                      </p:stCondLst>
+                      <p:childTnLst>
+                        <p:par>
+                          <p:cTn id="24" fill="hold">
+                            <p:stCondLst>
+                              <p:cond delay="0"/>
+                            </p:stCondLst>
+                            <p:childTnLst>
+                              <p:par>
+                                <p:cTn id="25" presetID="10" presetClass="entr" presetSubtype="0" fill="hold" nodeType="clickEffect">
+                                  <p:stCondLst>
+                                    <p:cond delay="0"/>
+                                  </p:stCondLst>
+                                  <p:childTnLst>
+                                    <p:set>
+                                      <p:cBhvr>
+                                        <p:cTn id="26" dur="1" fill="hold">
+                                          <p:stCondLst>
+                                            <p:cond delay="0"/>
+                                          </p:stCondLst>
+                                        </p:cTn>
+                                        <p:tgtEl>
+                                          <p:spTgt spid="4">
+                                            <p:txEl>
+                                              <p:pRg st="4" end="4"/>
+                                            </p:txEl>
+                                          </p:spTgt>
+                                        </p:tgtEl>
+                                        <p:attrNameLst>
+                                          <p:attrName>style.visibility</p:attrName>
+                                        </p:attrNameLst>
+                                      </p:cBhvr>
+                                      <p:to>
+                                        <p:strVal val="visible"/>
+                                      </p:to>
+                                    </p:set>
+                                    <p:animEffect transition="in" filter="fade">
+                                      <p:cBhvr>
+                                        <p:cTn id="27" dur="500"/>
+                                        <p:tgtEl>
+                                          <p:spTgt spid="4">
+                                            <p:txEl>
+                                              <p:pRg st="4" end="4"/>
+                                            </p:txEl>
+                                          </p:spTgt>
+                                        </p:tgtEl>
+                                      </p:cBhvr>
+                                    </p:animEffect>
+                                  </p:childTnLst>
+                                </p:cTn>
+                              </p:par>
+                            </p:childTnLst>
+                          </p:cTn>
+                        </p:par>
+                      </p:childTnLst>
+                    </p:cTn>
+                  </p:par>
+                </p:childTnLst>
+              </p:cTn>
+              <p:prevCondLst>
+                <p:cond evt="onPrev" delay="0">
+                  <p:tgtEl>
+                    <p:sldTgt/>
+                  </p:tgtEl>
+                </p:cond>
+              </p:prevCondLst>
+              <p:nextCondLst>
+                <p:cond evt="onNext" delay="0">
+                  <p:tgtEl>
+                    <p:sldTgt/>
+                  </p:tgtEl>
+                </p:cond>
+              </p:nextCondLst>
+            </p:seq>
+          </p:childTnLst>
+        </p:cTn>
+      </p:par>
+    </p:tnLst>
+  </p:timing>
 </p:sld>
 </file>
 
@@ -12111,6 +15426,219 @@
   <p:clrMapOvr>
     <a:masterClrMapping/>
   </p:clrMapOvr>
+  <p:timing>
+    <p:tnLst>
+      <p:par>
+        <p:cTn id="1" dur="indefinite" restart="never" nodeType="tmRoot">
+          <p:childTnLst>
+            <p:seq concurrent="1" nextAc="seek">
+              <p:cTn id="2" dur="indefinite" nodeType="mainSeq">
+                <p:childTnLst>
+                  <p:par>
+                    <p:cTn id="3" fill="hold">
+                      <p:stCondLst>
+                        <p:cond delay="indefinite"/>
+                      </p:stCondLst>
+                      <p:childTnLst>
+                        <p:par>
+                          <p:cTn id="4" fill="hold">
+                            <p:stCondLst>
+                              <p:cond delay="0"/>
+                            </p:stCondLst>
+                            <p:childTnLst>
+                              <p:par>
+                                <p:cTn id="5" presetID="10" presetClass="entr" presetSubtype="0" fill="hold" nodeType="clickEffect">
+                                  <p:stCondLst>
+                                    <p:cond delay="0"/>
+                                  </p:stCondLst>
+                                  <p:childTnLst>
+                                    <p:set>
+                                      <p:cBhvr>
+                                        <p:cTn id="6" dur="1" fill="hold">
+                                          <p:stCondLst>
+                                            <p:cond delay="0"/>
+                                          </p:stCondLst>
+                                        </p:cTn>
+                                        <p:tgtEl>
+                                          <p:spTgt spid="4">
+                                            <p:txEl>
+                                              <p:pRg st="0" end="0"/>
+                                            </p:txEl>
+                                          </p:spTgt>
+                                        </p:tgtEl>
+                                        <p:attrNameLst>
+                                          <p:attrName>style.visibility</p:attrName>
+                                        </p:attrNameLst>
+                                      </p:cBhvr>
+                                      <p:to>
+                                        <p:strVal val="visible"/>
+                                      </p:to>
+                                    </p:set>
+                                    <p:animEffect transition="in" filter="fade">
+                                      <p:cBhvr>
+                                        <p:cTn id="7" dur="500"/>
+                                        <p:tgtEl>
+                                          <p:spTgt spid="4">
+                                            <p:txEl>
+                                              <p:pRg st="0" end="0"/>
+                                            </p:txEl>
+                                          </p:spTgt>
+                                        </p:tgtEl>
+                                      </p:cBhvr>
+                                    </p:animEffect>
+                                  </p:childTnLst>
+                                </p:cTn>
+                              </p:par>
+                            </p:childTnLst>
+                          </p:cTn>
+                        </p:par>
+                      </p:childTnLst>
+                    </p:cTn>
+                  </p:par>
+                  <p:par>
+                    <p:cTn id="8" fill="hold">
+                      <p:stCondLst>
+                        <p:cond delay="indefinite"/>
+                      </p:stCondLst>
+                      <p:childTnLst>
+                        <p:par>
+                          <p:cTn id="9" fill="hold">
+                            <p:stCondLst>
+                              <p:cond delay="0"/>
+                            </p:stCondLst>
+                            <p:childTnLst>
+                              <p:par>
+                                <p:cTn id="10" presetID="10" presetClass="entr" presetSubtype="0" fill="hold" nodeType="clickEffect">
+                                  <p:stCondLst>
+                                    <p:cond delay="0"/>
+                                  </p:stCondLst>
+                                  <p:childTnLst>
+                                    <p:set>
+                                      <p:cBhvr>
+                                        <p:cTn id="11" dur="1" fill="hold">
+                                          <p:stCondLst>
+                                            <p:cond delay="0"/>
+                                          </p:stCondLst>
+                                        </p:cTn>
+                                        <p:tgtEl>
+                                          <p:spTgt spid="4">
+                                            <p:txEl>
+                                              <p:pRg st="1" end="1"/>
+                                            </p:txEl>
+                                          </p:spTgt>
+                                        </p:tgtEl>
+                                        <p:attrNameLst>
+                                          <p:attrName>style.visibility</p:attrName>
+                                        </p:attrNameLst>
+                                      </p:cBhvr>
+                                      <p:to>
+                                        <p:strVal val="visible"/>
+                                      </p:to>
+                                    </p:set>
+                                    <p:animEffect transition="in" filter="fade">
+                                      <p:cBhvr>
+                                        <p:cTn id="12" dur="500"/>
+                                        <p:tgtEl>
+                                          <p:spTgt spid="4">
+                                            <p:txEl>
+                                              <p:pRg st="1" end="1"/>
+                                            </p:txEl>
+                                          </p:spTgt>
+                                        </p:tgtEl>
+                                      </p:cBhvr>
+                                    </p:animEffect>
+                                  </p:childTnLst>
+                                </p:cTn>
+                              </p:par>
+                            </p:childTnLst>
+                          </p:cTn>
+                        </p:par>
+                      </p:childTnLst>
+                    </p:cTn>
+                  </p:par>
+                  <p:par>
+                    <p:cTn id="13" fill="hold">
+                      <p:stCondLst>
+                        <p:cond delay="indefinite"/>
+                      </p:stCondLst>
+                      <p:childTnLst>
+                        <p:par>
+                          <p:cTn id="14" fill="hold">
+                            <p:stCondLst>
+                              <p:cond delay="0"/>
+                            </p:stCondLst>
+                            <p:childTnLst>
+                              <p:par>
+                                <p:cTn id="15" presetID="10" presetClass="entr" presetSubtype="0" fill="hold" nodeType="clickEffect">
+                                  <p:stCondLst>
+                                    <p:cond delay="0"/>
+                                  </p:stCondLst>
+                                  <p:childTnLst>
+                                    <p:set>
+                                      <p:cBhvr>
+                                        <p:cTn id="16" dur="1" fill="hold">
+                                          <p:stCondLst>
+                                            <p:cond delay="0"/>
+                                          </p:stCondLst>
+                                        </p:cTn>
+                                        <p:tgtEl>
+                                          <p:spTgt spid="4">
+                                            <p:txEl>
+                                              <p:pRg st="2" end="2"/>
+                                            </p:txEl>
+                                          </p:spTgt>
+                                        </p:tgtEl>
+                                        <p:attrNameLst>
+                                          <p:attrName>style.visibility</p:attrName>
+                                        </p:attrNameLst>
+                                      </p:cBhvr>
+                                      <p:to>
+                                        <p:strVal val="visible"/>
+                                      </p:to>
+                                    </p:set>
+                                    <p:animEffect transition="in" filter="fade">
+                                      <p:cBhvr>
+                                        <p:cTn id="17" dur="500"/>
+                                        <p:tgtEl>
+                                          <p:spTgt spid="4">
+                                            <p:txEl>
+                                              <p:pRg st="2" end="2"/>
+                                            </p:txEl>
+                                          </p:spTgt>
+                                        </p:tgtEl>
+                                      </p:cBhvr>
+                                    </p:animEffect>
+                                  </p:childTnLst>
+                                </p:cTn>
+                              </p:par>
+                            </p:childTnLst>
+                          </p:cTn>
+                        </p:par>
+                      </p:childTnLst>
+                    </p:cTn>
+                  </p:par>
+                </p:childTnLst>
+              </p:cTn>
+              <p:prevCondLst>
+                <p:cond evt="onPrev" delay="0">
+                  <p:tgtEl>
+                    <p:sldTgt/>
+                  </p:tgtEl>
+                </p:cond>
+              </p:prevCondLst>
+              <p:nextCondLst>
+                <p:cond evt="onNext" delay="0">
+                  <p:tgtEl>
+                    <p:sldTgt/>
+                  </p:tgtEl>
+                </p:cond>
+              </p:nextCondLst>
+            </p:seq>
+          </p:childTnLst>
+        </p:cTn>
+      </p:par>
+    </p:tnLst>
+  </p:timing>
 </p:sld>
 </file>
 

</xml_diff>

<commit_message>
change repo link on the docs/Intro to Digital Twin Unity - connecting with webapi.pptx
</commit_message>
<xml_diff>
--- a/docs/Intro to Digital Twin Unity - connecting with webapi.pptx
+++ b/docs/Intro to Digital Twin Unity - connecting with webapi.pptx
@@ -10570,7 +10570,7 @@
         </p:spPr>
         <p:txBody>
           <a:bodyPr>
-            <a:normAutofit/>
+            <a:normAutofit lnSpcReduction="10000"/>
           </a:bodyPr>
           <a:lstStyle/>
           <a:p>
@@ -10622,22 +10622,34 @@
             </a:r>
           </a:p>
           <a:p>
-            <a:pPr>
-              <a:buFont typeface="Wingdings" panose="05000000000000000000" pitchFamily="2" charset="2"/>
-              <a:buChar char="Ø"/>
+            <a:pPr marL="927100" marR="5080" lvl="1" indent="-457200">
+              <a:lnSpc>
+                <a:spcPts val="3350"/>
+              </a:lnSpc>
+              <a:spcBef>
+                <a:spcPts val="515"/>
+              </a:spcBef>
+              <a:buFont typeface="Arial" panose="020B0604020202020204" pitchFamily="34" charset="0"/>
+              <a:buChar char="•"/>
+              <a:tabLst>
+                <a:tab pos="241300" algn="l"/>
+              </a:tabLst>
             </a:pPr>
             <a:r>
               <a:rPr lang="en-US" sz="3200" dirty="0"/>
               <a:t>Demo: </a:t>
             </a:r>
             <a:r>
-              <a:rPr lang="en-US" sz="3200" dirty="0">
+              <a:rPr lang="en-US" sz="2800" dirty="0">
+                <a:cs typeface="Consolas"/>
                 <a:hlinkClick r:id="rId3"/>
               </a:rPr>
-              <a:t>https://tinyurl.com/dtupou</a:t>
-            </a:r>
-            <a:r>
-              <a:rPr lang="en-US" sz="3200" dirty="0"/>
+              <a:t>https://github.com/MangoMetaverse/RealWorldWeatherDemo.git</a:t>
+            </a:r>
+            <a:r>
+              <a:rPr lang="en-US" sz="2800" dirty="0">
+                <a:cs typeface="Consolas"/>
+              </a:rPr>
               <a:t> </a:t>
             </a:r>
           </a:p>
@@ -15768,7 +15780,7 @@
                 <a:cs typeface="Consolas"/>
                 <a:hlinkClick r:id="rId3"/>
               </a:rPr>
-              <a:t>https://github.com/DutaChulaMetaverse/RealWorldWeatherDemo.git</a:t>
+              <a:t>https://github.com/MangoMetaverse/RealWorldWeatherDemo.git</a:t>
             </a:r>
             <a:r>
               <a:rPr lang="en-US" sz="2800" dirty="0">

</xml_diff>